<commit_message>
수정/docs : ppt 수정
</commit_message>
<xml_diff>
--- a/docs/Capstone-team14-presentation.pptx
+++ b/docs/Capstone-team14-presentation.pptx
@@ -2187,7 +2187,7 @@
       </p:grpSpPr>
       <p:sp>
         <p:nvSpPr>
-          <p:cNvPr id="182" name="선"/>
+          <p:cNvPr id="180" name="선"/>
           <p:cNvSpPr/>
           <p:nvPr/>
         </p:nvSpPr>
@@ -2222,7 +2222,7 @@
       </p:sp>
       <p:sp>
         <p:nvSpPr>
-          <p:cNvPr id="183" name="선"/>
+          <p:cNvPr id="181" name="선"/>
           <p:cNvSpPr/>
           <p:nvPr/>
         </p:nvSpPr>
@@ -2257,7 +2257,7 @@
       </p:sp>
       <p:sp>
         <p:nvSpPr>
-          <p:cNvPr id="184" name="슬라이드 번호"/>
+          <p:cNvPr id="182" name="슬라이드 번호"/>
           <p:cNvSpPr txBox="1"/>
           <p:nvPr>
             <p:ph type="sldNum" sz="quarter" idx="4294967295"/>
@@ -2288,7 +2288,7 @@
       </p:sp>
       <p:sp>
         <p:nvSpPr>
-          <p:cNvPr id="185" name="주요 기능 - 모델 변경 사항"/>
+          <p:cNvPr id="183" name="주요 기능 - 모델 변경 사항"/>
           <p:cNvSpPr txBox="1"/>
           <p:nvPr>
             <p:ph type="title"/>
@@ -2316,7 +2316,7 @@
       </p:sp>
       <p:sp>
         <p:nvSpPr>
-          <p:cNvPr id="186" name="선"/>
+          <p:cNvPr id="184" name="선"/>
           <p:cNvSpPr/>
           <p:nvPr/>
         </p:nvSpPr>
@@ -2351,7 +2351,7 @@
       </p:sp>
       <p:sp>
         <p:nvSpPr>
-          <p:cNvPr id="187" name="TextBox 21"/>
+          <p:cNvPr id="185" name="TextBox 21"/>
           <p:cNvSpPr txBox="1"/>
           <p:nvPr/>
         </p:nvSpPr>
@@ -2399,7 +2399,7 @@
       </p:sp>
       <p:grpSp>
         <p:nvGrpSpPr>
-          <p:cNvPr id="192" name="그룹"/>
+          <p:cNvPr id="190" name="그룹"/>
           <p:cNvGrpSpPr/>
           <p:nvPr/>
         </p:nvGrpSpPr>
@@ -2413,7 +2413,7 @@
         </p:grpSpPr>
         <p:sp>
           <p:nvSpPr>
-            <p:cNvPr id="188" name="선"/>
+            <p:cNvPr id="186" name="선"/>
             <p:cNvSpPr/>
             <p:nvPr/>
           </p:nvSpPr>
@@ -2453,7 +2453,7 @@
         </p:sp>
         <p:sp>
           <p:nvSpPr>
-            <p:cNvPr id="189" name="선"/>
+            <p:cNvPr id="187" name="선"/>
             <p:cNvSpPr/>
             <p:nvPr/>
           </p:nvSpPr>
@@ -2493,7 +2493,7 @@
         </p:sp>
         <p:sp>
           <p:nvSpPr>
-            <p:cNvPr id="190" name="선"/>
+            <p:cNvPr id="188" name="선"/>
             <p:cNvSpPr/>
             <p:nvPr/>
           </p:nvSpPr>
@@ -2533,7 +2533,7 @@
         </p:sp>
         <p:sp>
           <p:nvSpPr>
-            <p:cNvPr id="191" name="선"/>
+            <p:cNvPr id="189" name="선"/>
             <p:cNvSpPr/>
             <p:nvPr/>
           </p:nvSpPr>
@@ -2574,7 +2574,7 @@
       </p:grpSp>
       <p:sp>
         <p:nvSpPr>
-          <p:cNvPr id="193" name="슬라이드 번호"/>
+          <p:cNvPr id="191" name="슬라이드 번호"/>
           <p:cNvSpPr txBox="1"/>
           <p:nvPr/>
         </p:nvSpPr>
@@ -2625,7 +2625,7 @@
       </p:sp>
       <p:grpSp>
         <p:nvGrpSpPr>
-          <p:cNvPr id="196" name="Project Planning"/>
+          <p:cNvPr id="194" name="Project Planning"/>
           <p:cNvGrpSpPr/>
           <p:nvPr/>
         </p:nvGrpSpPr>
@@ -2639,7 +2639,7 @@
         </p:grpSpPr>
         <p:sp>
           <p:nvSpPr>
-            <p:cNvPr id="194" name="직사각형"/>
+            <p:cNvPr id="192" name="직사각형"/>
             <p:cNvSpPr/>
             <p:nvPr/>
           </p:nvSpPr>
@@ -2685,7 +2685,7 @@
         </p:sp>
         <p:sp>
           <p:nvSpPr>
-            <p:cNvPr id="195" name="Train Set에서도 낮은 정확도"/>
+            <p:cNvPr id="193" name="Train Set에서도 낮은 정확도"/>
             <p:cNvSpPr txBox="1"/>
             <p:nvPr/>
           </p:nvSpPr>
@@ -2747,7 +2747,7 @@
       </p:grpSp>
       <p:grpSp>
         <p:nvGrpSpPr>
-          <p:cNvPr id="199" name="Part"/>
+          <p:cNvPr id="197" name="Part"/>
           <p:cNvGrpSpPr/>
           <p:nvPr/>
         </p:nvGrpSpPr>
@@ -2761,7 +2761,7 @@
         </p:grpSpPr>
         <p:sp>
           <p:nvSpPr>
-            <p:cNvPr id="197" name="직사각형"/>
+            <p:cNvPr id="195" name="직사각형"/>
             <p:cNvSpPr/>
             <p:nvPr/>
           </p:nvSpPr>
@@ -2807,7 +2807,7 @@
         </p:sp>
         <p:sp>
           <p:nvSpPr>
-            <p:cNvPr id="198" name="데이터의 변동폭이 크다"/>
+            <p:cNvPr id="196" name="데이터의 변동폭이 크다"/>
             <p:cNvSpPr txBox="1"/>
             <p:nvPr/>
           </p:nvSpPr>
@@ -2862,7 +2862,7 @@
       </p:grpSp>
       <p:grpSp>
         <p:nvGrpSpPr>
-          <p:cNvPr id="202" name="Part"/>
+          <p:cNvPr id="200" name="Part"/>
           <p:cNvGrpSpPr/>
           <p:nvPr/>
         </p:nvGrpSpPr>
@@ -2876,7 +2876,7 @@
         </p:grpSpPr>
         <p:sp>
           <p:nvSpPr>
-            <p:cNvPr id="200" name="직사각형"/>
+            <p:cNvPr id="198" name="직사각형"/>
             <p:cNvSpPr/>
             <p:nvPr/>
           </p:nvSpPr>
@@ -2922,7 +2922,7 @@
         </p:sp>
         <p:sp>
           <p:nvSpPr>
-            <p:cNvPr id="201" name="멘토님의 조언"/>
+            <p:cNvPr id="199" name="멘토님의 조언"/>
             <p:cNvSpPr txBox="1"/>
             <p:nvPr/>
           </p:nvSpPr>
@@ -2977,7 +2977,7 @@
       </p:grpSp>
       <p:grpSp>
         <p:nvGrpSpPr>
-          <p:cNvPr id="205" name="Managing"/>
+          <p:cNvPr id="203" name="Managing"/>
           <p:cNvGrpSpPr/>
           <p:nvPr/>
         </p:nvGrpSpPr>
@@ -2991,7 +2991,7 @@
         </p:grpSpPr>
         <p:sp>
           <p:nvSpPr>
-            <p:cNvPr id="203" name="직사각형"/>
+            <p:cNvPr id="201" name="직사각형"/>
             <p:cNvSpPr/>
             <p:nvPr/>
           </p:nvSpPr>
@@ -3037,7 +3037,7 @@
         </p:sp>
         <p:sp>
           <p:nvSpPr>
-            <p:cNvPr id="204" name="Face Detection에서 일반적인 방식X"/>
+            <p:cNvPr id="202" name="Face Detection에서 일반적인 방식X"/>
             <p:cNvSpPr txBox="1"/>
             <p:nvPr/>
           </p:nvSpPr>
@@ -3105,7 +3105,7 @@
       </p:grpSp>
       <p:grpSp>
         <p:nvGrpSpPr>
-          <p:cNvPr id="208" name="Marketing…"/>
+          <p:cNvPr id="206" name="Marketing…"/>
           <p:cNvGrpSpPr/>
           <p:nvPr/>
         </p:nvGrpSpPr>
@@ -3119,7 +3119,7 @@
         </p:grpSpPr>
         <p:sp>
           <p:nvSpPr>
-            <p:cNvPr id="206" name="원"/>
+            <p:cNvPr id="204" name="원"/>
             <p:cNvSpPr/>
             <p:nvPr/>
           </p:nvSpPr>
@@ -3162,7 +3162,7 @@
         </p:sp>
         <p:sp>
           <p:nvSpPr>
-            <p:cNvPr id="207" name="새로운 모델 개발 결정"/>
+            <p:cNvPr id="205" name="새로운 모델 개발 결정"/>
             <p:cNvSpPr txBox="1"/>
             <p:nvPr/>
           </p:nvSpPr>
@@ -3240,7 +3240,7 @@
       </p:grpSpPr>
       <p:sp>
         <p:nvSpPr>
-          <p:cNvPr id="210" name="슬라이드 번호"/>
+          <p:cNvPr id="208" name="슬라이드 번호"/>
           <p:cNvSpPr txBox="1"/>
           <p:nvPr>
             <p:ph type="sldNum" sz="quarter" idx="4294967295"/>
@@ -3271,7 +3271,7 @@
       </p:sp>
       <p:sp>
         <p:nvSpPr>
-          <p:cNvPr id="211" name="주요 기능 - Data Labeling &amp; Data Processing"/>
+          <p:cNvPr id="209" name="주요 기능 - Data Labeling &amp; Data Processing"/>
           <p:cNvSpPr txBox="1"/>
           <p:nvPr>
             <p:ph type="title"/>
@@ -3299,7 +3299,7 @@
       </p:sp>
       <p:sp>
         <p:nvSpPr>
-          <p:cNvPr id="212" name="선"/>
+          <p:cNvPr id="210" name="선"/>
           <p:cNvSpPr/>
           <p:nvPr/>
         </p:nvSpPr>
@@ -3334,7 +3334,7 @@
       </p:sp>
       <p:grpSp>
         <p:nvGrpSpPr>
-          <p:cNvPr id="225" name="그룹 2"/>
+          <p:cNvPr id="223" name="그룹 2"/>
           <p:cNvGrpSpPr/>
           <p:nvPr/>
         </p:nvGrpSpPr>
@@ -3348,7 +3348,7 @@
         </p:grpSpPr>
         <p:grpSp>
           <p:nvGrpSpPr>
-            <p:cNvPr id="215" name="3"/>
+            <p:cNvPr id="213" name="3"/>
             <p:cNvGrpSpPr/>
             <p:nvPr/>
           </p:nvGrpSpPr>
@@ -3362,7 +3362,7 @@
           </p:grpSpPr>
           <p:sp>
             <p:nvSpPr>
-              <p:cNvPr id="213" name="도형"/>
+              <p:cNvPr id="211" name="도형"/>
               <p:cNvSpPr/>
               <p:nvPr/>
             </p:nvSpPr>
@@ -3454,7 +3454,7 @@
           </p:sp>
           <p:sp>
             <p:nvSpPr>
-              <p:cNvPr id="214" name="3"/>
+              <p:cNvPr id="212" name="3"/>
               <p:cNvSpPr txBox="1"/>
               <p:nvPr/>
             </p:nvSpPr>
@@ -3509,7 +3509,7 @@
         </p:grpSp>
         <p:grpSp>
           <p:nvGrpSpPr>
-            <p:cNvPr id="218" name="2"/>
+            <p:cNvPr id="216" name="2"/>
             <p:cNvGrpSpPr/>
             <p:nvPr/>
           </p:nvGrpSpPr>
@@ -3523,7 +3523,7 @@
           </p:grpSpPr>
           <p:sp>
             <p:nvSpPr>
-              <p:cNvPr id="216" name="도형"/>
+              <p:cNvPr id="214" name="도형"/>
               <p:cNvSpPr/>
               <p:nvPr/>
             </p:nvSpPr>
@@ -3615,7 +3615,7 @@
           </p:sp>
           <p:sp>
             <p:nvSpPr>
-              <p:cNvPr id="217" name="2"/>
+              <p:cNvPr id="215" name="2"/>
               <p:cNvSpPr txBox="1"/>
               <p:nvPr/>
             </p:nvSpPr>
@@ -3670,7 +3670,7 @@
         </p:grpSp>
         <p:grpSp>
           <p:nvGrpSpPr>
-            <p:cNvPr id="221" name="1"/>
+            <p:cNvPr id="219" name="1"/>
             <p:cNvGrpSpPr/>
             <p:nvPr/>
           </p:nvGrpSpPr>
@@ -3684,7 +3684,7 @@
           </p:grpSpPr>
           <p:sp>
             <p:nvSpPr>
-              <p:cNvPr id="219" name="도형"/>
+              <p:cNvPr id="217" name="도형"/>
               <p:cNvSpPr/>
               <p:nvPr/>
             </p:nvSpPr>
@@ -3776,7 +3776,7 @@
           </p:sp>
           <p:sp>
             <p:nvSpPr>
-              <p:cNvPr id="220" name="1"/>
+              <p:cNvPr id="218" name="1"/>
               <p:cNvSpPr txBox="1"/>
               <p:nvPr/>
             </p:nvSpPr>
@@ -3831,7 +3831,7 @@
         </p:grpSp>
         <p:sp>
           <p:nvSpPr>
-            <p:cNvPr id="222" name="얼굴 데이터 확보 - Kaggle, Github"/>
+            <p:cNvPr id="220" name="얼굴 데이터 확보 - Kaggle, Github"/>
             <p:cNvSpPr txBox="1"/>
             <p:nvPr/>
           </p:nvSpPr>
@@ -3892,7 +3892,7 @@
         </p:sp>
         <p:sp>
           <p:nvSpPr>
-            <p:cNvPr id="223" name="Data Labeling"/>
+            <p:cNvPr id="221" name="Data Labeling"/>
             <p:cNvSpPr txBox="1"/>
             <p:nvPr/>
           </p:nvSpPr>
@@ -3946,7 +3946,7 @@
         </p:sp>
         <p:sp>
           <p:nvSpPr>
-            <p:cNvPr id="224" name="Image Crop"/>
+            <p:cNvPr id="222" name="Image Crop"/>
             <p:cNvSpPr txBox="1"/>
             <p:nvPr/>
           </p:nvSpPr>
@@ -4027,7 +4027,7 @@
       </p:grpSpPr>
       <p:sp>
         <p:nvSpPr>
-          <p:cNvPr id="227" name="슬라이드 번호"/>
+          <p:cNvPr id="225" name="슬라이드 번호"/>
           <p:cNvSpPr txBox="1"/>
           <p:nvPr>
             <p:ph type="sldNum" sz="quarter" idx="4294967295"/>
@@ -4058,7 +4058,7 @@
       </p:sp>
       <p:sp>
         <p:nvSpPr>
-          <p:cNvPr id="228" name="주요 기능 - Data Labeling &amp; Data Processing"/>
+          <p:cNvPr id="226" name="주요 기능 - Data Labeling &amp; Data Processing"/>
           <p:cNvSpPr txBox="1"/>
           <p:nvPr>
             <p:ph type="title"/>
@@ -4086,7 +4086,7 @@
       </p:sp>
       <p:sp>
         <p:nvSpPr>
-          <p:cNvPr id="229" name="선"/>
+          <p:cNvPr id="227" name="선"/>
           <p:cNvSpPr/>
           <p:nvPr/>
         </p:nvSpPr>
@@ -4121,7 +4121,7 @@
       </p:sp>
       <p:sp>
         <p:nvSpPr>
-          <p:cNvPr id="230" name="유의미한 데이터를 추출하기 위해 정면 사진, 얼굴형 판단이 가능한 사진 75,000장 확보."/>
+          <p:cNvPr id="228" name="유의미한 데이터를 추출하기 위해 정면 사진, 얼굴형 판단이 가능한 사진 75,000장 확보."/>
           <p:cNvSpPr txBox="1"/>
           <p:nvPr/>
         </p:nvSpPr>
@@ -4231,7 +4231,7 @@
       </p:sp>
       <p:sp>
         <p:nvSpPr>
-          <p:cNvPr id="231" name="조사한 자료와 논문을 바탕으로 얼굴형 판단에 대한 기준을 설정하여 총 4가지의 얼굴형으로 구분…"/>
+          <p:cNvPr id="229" name="조사한 자료와 논문을 바탕으로 얼굴형 판단에 대한 기준을 설정하여 총 4가지의 얼굴형으로 구분…"/>
           <p:cNvSpPr txBox="1"/>
           <p:nvPr/>
         </p:nvSpPr>
@@ -4416,7 +4416,7 @@
       </p:sp>
       <p:sp>
         <p:nvSpPr>
-          <p:cNvPr id="232" name="얼굴 데이터 확보 - Kaggle, Github"/>
+          <p:cNvPr id="230" name="얼굴 데이터 확보 - Kaggle, Github"/>
           <p:cNvSpPr txBox="1"/>
           <p:nvPr/>
         </p:nvSpPr>
@@ -4480,7 +4480,7 @@
       </p:sp>
       <p:grpSp>
         <p:nvGrpSpPr>
-          <p:cNvPr id="239" name="그룹 1"/>
+          <p:cNvPr id="237" name="그룹 1"/>
           <p:cNvGrpSpPr/>
           <p:nvPr/>
         </p:nvGrpSpPr>
@@ -4494,7 +4494,7 @@
         </p:grpSpPr>
         <p:grpSp>
           <p:nvGrpSpPr>
-            <p:cNvPr id="235" name="그룹 16"/>
+            <p:cNvPr id="233" name="그룹 16"/>
             <p:cNvGrpSpPr/>
             <p:nvPr/>
           </p:nvGrpSpPr>
@@ -4508,7 +4508,7 @@
           </p:grpSpPr>
           <p:pic>
             <p:nvPicPr>
-              <p:cNvPr id="233" name="그림 17" descr="그림 17"/>
+              <p:cNvPr id="231" name="그림 17" descr="그림 17"/>
               <p:cNvPicPr>
                 <a:picLocks noChangeAspect="1"/>
               </p:cNvPicPr>
@@ -4548,7 +4548,7 @@
           </p:pic>
           <p:pic>
             <p:nvPicPr>
-              <p:cNvPr id="234" name="그래픽 18" descr="그래픽 18"/>
+              <p:cNvPr id="232" name="그래픽 18" descr="그래픽 18"/>
               <p:cNvPicPr>
                 <a:picLocks noChangeAspect="1"/>
               </p:cNvPicPr>
@@ -4580,7 +4580,7 @@
         </p:grpSp>
         <p:grpSp>
           <p:nvGrpSpPr>
-            <p:cNvPr id="238" name="그룹 19"/>
+            <p:cNvPr id="236" name="그룹 19"/>
             <p:cNvGrpSpPr/>
             <p:nvPr/>
           </p:nvGrpSpPr>
@@ -4594,7 +4594,7 @@
           </p:grpSpPr>
           <p:pic>
             <p:nvPicPr>
-              <p:cNvPr id="236" name="그림 20" descr="그림 20"/>
+              <p:cNvPr id="234" name="그림 20" descr="그림 20"/>
               <p:cNvPicPr>
                 <a:picLocks noChangeAspect="1"/>
               </p:cNvPicPr>
@@ -4634,7 +4634,7 @@
           </p:pic>
           <p:pic>
             <p:nvPicPr>
-              <p:cNvPr id="237" name="그래픽 21" descr="그래픽 21"/>
+              <p:cNvPr id="235" name="그래픽 21" descr="그래픽 21"/>
               <p:cNvPicPr>
                 <a:picLocks noChangeAspect="1"/>
               </p:cNvPicPr>
@@ -4667,7 +4667,7 @@
       </p:grpSp>
       <p:grpSp>
         <p:nvGrpSpPr>
-          <p:cNvPr id="249" name="그룹 12"/>
+          <p:cNvPr id="247" name="그룹 12"/>
           <p:cNvGrpSpPr/>
           <p:nvPr/>
         </p:nvGrpSpPr>
@@ -4681,7 +4681,7 @@
         </p:grpSpPr>
         <p:grpSp>
           <p:nvGrpSpPr>
-            <p:cNvPr id="244" name="그룹 10"/>
+            <p:cNvPr id="242" name="그룹 10"/>
             <p:cNvGrpSpPr/>
             <p:nvPr/>
           </p:nvGrpSpPr>
@@ -4695,7 +4695,7 @@
           </p:grpSpPr>
           <p:pic>
             <p:nvPicPr>
-              <p:cNvPr id="240" name="그림 3" descr="그림 3"/>
+              <p:cNvPr id="238" name="그림 3" descr="그림 3"/>
               <p:cNvPicPr>
                 <a:picLocks noChangeAspect="1"/>
               </p:cNvPicPr>
@@ -4726,7 +4726,7 @@
           </p:pic>
           <p:pic>
             <p:nvPicPr>
-              <p:cNvPr id="241" name="그림 5" descr="그림 5"/>
+              <p:cNvPr id="239" name="그림 5" descr="그림 5"/>
               <p:cNvPicPr>
                 <a:picLocks noChangeAspect="1"/>
               </p:cNvPicPr>
@@ -4757,7 +4757,7 @@
           </p:pic>
           <p:pic>
             <p:nvPicPr>
-              <p:cNvPr id="242" name="그림 7" descr="그림 7"/>
+              <p:cNvPr id="240" name="그림 7" descr="그림 7"/>
               <p:cNvPicPr>
                 <a:picLocks noChangeAspect="1"/>
               </p:cNvPicPr>
@@ -4788,7 +4788,7 @@
           </p:pic>
           <p:pic>
             <p:nvPicPr>
-              <p:cNvPr id="243" name="그림 9" descr="그림 9"/>
+              <p:cNvPr id="241" name="그림 9" descr="그림 9"/>
               <p:cNvPicPr>
                 <a:picLocks noChangeAspect="1"/>
               </p:cNvPicPr>
@@ -4820,7 +4820,7 @@
         </p:grpSp>
         <p:sp>
           <p:nvSpPr>
-            <p:cNvPr id="245" name="TextBox 11"/>
+            <p:cNvPr id="243" name="TextBox 11"/>
             <p:cNvSpPr txBox="1"/>
             <p:nvPr/>
           </p:nvSpPr>
@@ -4871,7 +4871,7 @@
         </p:sp>
         <p:sp>
           <p:nvSpPr>
-            <p:cNvPr id="246" name="TextBox 33"/>
+            <p:cNvPr id="244" name="TextBox 33"/>
             <p:cNvSpPr txBox="1"/>
             <p:nvPr/>
           </p:nvSpPr>
@@ -4922,7 +4922,7 @@
         </p:sp>
         <p:sp>
           <p:nvSpPr>
-            <p:cNvPr id="247" name="TextBox 34"/>
+            <p:cNvPr id="245" name="TextBox 34"/>
             <p:cNvSpPr txBox="1"/>
             <p:nvPr/>
           </p:nvSpPr>
@@ -4973,7 +4973,7 @@
         </p:sp>
         <p:sp>
           <p:nvSpPr>
-            <p:cNvPr id="248" name="TextBox 35"/>
+            <p:cNvPr id="246" name="TextBox 35"/>
             <p:cNvSpPr txBox="1"/>
             <p:nvPr/>
           </p:nvSpPr>
@@ -5025,7 +5025,7 @@
       </p:grpSp>
       <p:sp>
         <p:nvSpPr>
-          <p:cNvPr id="250" name="TextBox 13"/>
+          <p:cNvPr id="248" name="TextBox 13"/>
           <p:cNvSpPr txBox="1"/>
           <p:nvPr/>
         </p:nvSpPr>
@@ -5080,7 +5080,7 @@
       </p:sp>
       <p:sp>
         <p:nvSpPr>
-          <p:cNvPr id="251" name="얼굴 데이터 확보 - Kaggle, Github"/>
+          <p:cNvPr id="249" name="얼굴 데이터 확보 - Kaggle, Github"/>
           <p:cNvSpPr txBox="1"/>
           <p:nvPr/>
         </p:nvSpPr>
@@ -5157,7 +5157,7 @@
       </p:grpSpPr>
       <p:sp>
         <p:nvSpPr>
-          <p:cNvPr id="253" name="슬라이드 번호"/>
+          <p:cNvPr id="251" name="슬라이드 번호"/>
           <p:cNvSpPr txBox="1"/>
           <p:nvPr>
             <p:ph type="sldNum" sz="quarter" idx="4294967295"/>
@@ -5188,7 +5188,7 @@
       </p:sp>
       <p:sp>
         <p:nvSpPr>
-          <p:cNvPr id="254" name="주요 기능 - Data Labeling &amp; Data Processing"/>
+          <p:cNvPr id="252" name="주요 기능 - Data Labeling &amp; Data Processing"/>
           <p:cNvSpPr txBox="1"/>
           <p:nvPr>
             <p:ph type="title"/>
@@ -5219,7 +5219,7 @@
       </p:sp>
       <p:sp>
         <p:nvSpPr>
-          <p:cNvPr id="255" name="선"/>
+          <p:cNvPr id="253" name="선"/>
           <p:cNvSpPr/>
           <p:nvPr/>
         </p:nvSpPr>
@@ -5254,7 +5254,7 @@
       </p:sp>
       <p:sp>
         <p:nvSpPr>
-          <p:cNvPr id="256" name="얼굴 데이터 확보 - Kaggle, Github"/>
+          <p:cNvPr id="254" name="얼굴 데이터 확보 - Kaggle, Github"/>
           <p:cNvSpPr txBox="1"/>
           <p:nvPr/>
         </p:nvSpPr>
@@ -5305,7 +5305,7 @@
       </p:sp>
       <p:sp>
         <p:nvSpPr>
-          <p:cNvPr id="257" name="모델 학습 시, 방해가 되는 특징점을 제거하기 위해서 OpenCV를 이용하여 얼굴만 추출"/>
+          <p:cNvPr id="255" name="모델 학습 시, 방해가 되는 특징점을 제거하기 위해서 OpenCV를 이용하여 얼굴만 추출"/>
           <p:cNvSpPr txBox="1"/>
           <p:nvPr/>
         </p:nvSpPr>
@@ -5368,7 +5368,7 @@
       </p:sp>
       <p:sp>
         <p:nvSpPr>
-          <p:cNvPr id="258" name="Overfitting 방지 및 모델 성능 향상을  위해 Keras의 ImageDataGenerator를 사용한다. 좌우 반전, 좌우 이동, 밝기 조절, 정규화 이미지로 데이터를 추가 확보한다."/>
+          <p:cNvPr id="256" name="Overfitting 방지 및 모델 성능 향상을  위해 Keras의 ImageDataGenerator를 사용한다. 좌우 반전, 좌우 이동, 밝기 조절, 정규화 이미지로 데이터를 추가 확보한다."/>
           <p:cNvSpPr txBox="1"/>
           <p:nvPr/>
         </p:nvSpPr>
@@ -5444,7 +5444,7 @@
       </p:sp>
       <p:grpSp>
         <p:nvGrpSpPr>
-          <p:cNvPr id="262" name="그룹 25"/>
+          <p:cNvPr id="260" name="그룹 25"/>
           <p:cNvGrpSpPr/>
           <p:nvPr/>
         </p:nvGrpSpPr>
@@ -5458,7 +5458,7 @@
         </p:grpSpPr>
         <p:pic>
           <p:nvPicPr>
-            <p:cNvPr id="259" name="그림 26" descr="그림 26"/>
+            <p:cNvPr id="257" name="그림 26" descr="그림 26"/>
             <p:cNvPicPr>
               <a:picLocks noChangeAspect="1"/>
             </p:cNvPicPr>
@@ -5495,7 +5495,7 @@
         </p:pic>
         <p:pic>
           <p:nvPicPr>
-            <p:cNvPr id="260" name="그림 27" descr="그림 27"/>
+            <p:cNvPr id="258" name="그림 27" descr="그림 27"/>
             <p:cNvPicPr>
               <a:picLocks noChangeAspect="1"/>
             </p:cNvPicPr>
@@ -5532,7 +5532,7 @@
         </p:pic>
         <p:sp>
           <p:nvSpPr>
-            <p:cNvPr id="261" name="화살표: 아래쪽 28"/>
+            <p:cNvPr id="259" name="화살표: 아래쪽 28"/>
             <p:cNvSpPr/>
             <p:nvPr/>
           </p:nvSpPr>
@@ -5618,7 +5618,7 @@
       </p:grpSp>
       <p:sp>
         <p:nvSpPr>
-          <p:cNvPr id="263" name="얼굴 데이터 확보 - Kaggle, Github"/>
+          <p:cNvPr id="261" name="얼굴 데이터 확보 - Kaggle, Github"/>
           <p:cNvSpPr txBox="1"/>
           <p:nvPr/>
         </p:nvSpPr>
@@ -5695,7 +5695,7 @@
       </p:grpSpPr>
       <p:sp>
         <p:nvSpPr>
-          <p:cNvPr id="265" name="슬라이드 번호"/>
+          <p:cNvPr id="263" name="슬라이드 번호"/>
           <p:cNvSpPr txBox="1"/>
           <p:nvPr>
             <p:ph type="sldNum" sz="quarter" idx="4294967295"/>
@@ -5726,7 +5726,7 @@
       </p:sp>
       <p:sp>
         <p:nvSpPr>
-          <p:cNvPr id="266" name="주요 기능 - 얼굴형 판단"/>
+          <p:cNvPr id="264" name="주요 기능 - 얼굴형 판단"/>
           <p:cNvSpPr txBox="1"/>
           <p:nvPr>
             <p:ph type="title"/>
@@ -5760,7 +5760,7 @@
       </p:sp>
       <p:sp>
         <p:nvSpPr>
-          <p:cNvPr id="267" name="선"/>
+          <p:cNvPr id="265" name="선"/>
           <p:cNvSpPr/>
           <p:nvPr/>
         </p:nvSpPr>
@@ -5795,7 +5795,7 @@
       </p:sp>
       <p:grpSp>
         <p:nvGrpSpPr>
-          <p:cNvPr id="280" name="다이어그램 6"/>
+          <p:cNvPr id="278" name="다이어그램 6"/>
           <p:cNvGrpSpPr/>
           <p:nvPr/>
         </p:nvGrpSpPr>
@@ -5809,7 +5809,7 @@
         </p:grpSpPr>
         <p:grpSp>
           <p:nvGrpSpPr>
-            <p:cNvPr id="270" name="그룹"/>
+            <p:cNvPr id="268" name="그룹"/>
             <p:cNvGrpSpPr/>
             <p:nvPr/>
           </p:nvGrpSpPr>
@@ -5823,7 +5823,7 @@
           </p:grpSpPr>
           <p:sp>
             <p:nvSpPr>
-              <p:cNvPr id="268" name="모서리가 둥근 직사각형"/>
+              <p:cNvPr id="266" name="모서리가 둥근 직사각형"/>
               <p:cNvSpPr/>
               <p:nvPr/>
             </p:nvSpPr>
@@ -5871,7 +5871,7 @@
           </p:sp>
           <p:sp>
             <p:nvSpPr>
-              <p:cNvPr id="269" name="CNN 모델"/>
+              <p:cNvPr id="267" name="CNN 모델"/>
               <p:cNvSpPr txBox="1"/>
               <p:nvPr/>
             </p:nvSpPr>
@@ -5926,7 +5926,7 @@
         </p:grpSp>
         <p:sp>
           <p:nvSpPr>
-            <p:cNvPr id="271" name="Image Classification에 최적화된 신경망 구조…"/>
+            <p:cNvPr id="269" name="Image Classification에 최적화된 신경망 구조…"/>
             <p:cNvSpPr txBox="1"/>
             <p:nvPr/>
           </p:nvSpPr>
@@ -6023,7 +6023,7 @@
         </p:sp>
         <p:grpSp>
           <p:nvGrpSpPr>
-            <p:cNvPr id="274" name="그룹"/>
+            <p:cNvPr id="272" name="그룹"/>
             <p:cNvGrpSpPr/>
             <p:nvPr/>
           </p:nvGrpSpPr>
@@ -6037,7 +6037,7 @@
           </p:grpSpPr>
           <p:sp>
             <p:nvSpPr>
-              <p:cNvPr id="272" name="모서리가 둥근 직사각형"/>
+              <p:cNvPr id="270" name="모서리가 둥근 직사각형"/>
               <p:cNvSpPr/>
               <p:nvPr/>
             </p:nvSpPr>
@@ -6085,7 +6085,7 @@
           </p:sp>
           <p:sp>
             <p:nvSpPr>
-              <p:cNvPr id="273" name="선택 모델"/>
+              <p:cNvPr id="271" name="선택 모델"/>
               <p:cNvSpPr txBox="1"/>
               <p:nvPr/>
             </p:nvSpPr>
@@ -6139,7 +6139,7 @@
         </p:grpSp>
         <p:sp>
           <p:nvSpPr>
-            <p:cNvPr id="275" name="VGGNet(VGG16)…"/>
+            <p:cNvPr id="273" name="VGGNet(VGG16)…"/>
             <p:cNvSpPr txBox="1"/>
             <p:nvPr/>
           </p:nvSpPr>
@@ -6318,7 +6318,7 @@
         </p:sp>
         <p:grpSp>
           <p:nvGrpSpPr>
-            <p:cNvPr id="278" name="그룹"/>
+            <p:cNvPr id="276" name="그룹"/>
             <p:cNvGrpSpPr/>
             <p:nvPr/>
           </p:nvGrpSpPr>
@@ -6332,7 +6332,7 @@
           </p:grpSpPr>
           <p:sp>
             <p:nvSpPr>
-              <p:cNvPr id="276" name="모서리가 둥근 직사각형"/>
+              <p:cNvPr id="274" name="모서리가 둥근 직사각형"/>
               <p:cNvSpPr/>
               <p:nvPr/>
             </p:nvSpPr>
@@ -6380,7 +6380,7 @@
           </p:sp>
           <p:sp>
             <p:nvSpPr>
-              <p:cNvPr id="277" name="학습 진행"/>
+              <p:cNvPr id="275" name="학습 진행"/>
               <p:cNvSpPr txBox="1"/>
               <p:nvPr/>
             </p:nvSpPr>
@@ -6438,7 +6438,7 @@
         </p:grpSp>
         <p:sp>
           <p:nvSpPr>
-            <p:cNvPr id="279" name="Transfer Learning"/>
+            <p:cNvPr id="277" name="Transfer Learning"/>
             <p:cNvSpPr txBox="1"/>
             <p:nvPr/>
           </p:nvSpPr>
@@ -6492,7 +6492,7 @@
       </p:grpSp>
       <p:grpSp>
         <p:nvGrpSpPr>
-          <p:cNvPr id="285" name="그룹 7"/>
+          <p:cNvPr id="283" name="그룹 7"/>
           <p:cNvGrpSpPr/>
           <p:nvPr/>
         </p:nvGrpSpPr>
@@ -6506,7 +6506,7 @@
         </p:grpSpPr>
         <p:grpSp>
           <p:nvGrpSpPr>
-            <p:cNvPr id="283" name="그룹 8"/>
+            <p:cNvPr id="281" name="그룹 8"/>
             <p:cNvGrpSpPr/>
             <p:nvPr/>
           </p:nvGrpSpPr>
@@ -6520,7 +6520,7 @@
           </p:grpSpPr>
           <p:sp>
             <p:nvSpPr>
-              <p:cNvPr id="281" name="TextBox 10"/>
+              <p:cNvPr id="279" name="TextBox 10"/>
               <p:cNvSpPr txBox="1"/>
               <p:nvPr/>
             </p:nvSpPr>
@@ -6571,7 +6571,7 @@
           </p:sp>
           <p:sp>
             <p:nvSpPr>
-              <p:cNvPr id="282" name="화살표: 오른쪽 11"/>
+              <p:cNvPr id="280" name="화살표: 오른쪽 11"/>
               <p:cNvSpPr/>
               <p:nvPr/>
             </p:nvSpPr>
@@ -6617,7 +6617,7 @@
         </p:grpSp>
         <p:sp>
           <p:nvSpPr>
-            <p:cNvPr id="284" name="순서도: 대체 처리 9"/>
+            <p:cNvPr id="282" name="순서도: 대체 처리 9"/>
             <p:cNvSpPr/>
             <p:nvPr/>
           </p:nvSpPr>
@@ -6738,7 +6738,7 @@
       </p:grpSpPr>
       <p:sp>
         <p:nvSpPr>
-          <p:cNvPr id="287" name="슬라이드 번호"/>
+          <p:cNvPr id="285" name="슬라이드 번호"/>
           <p:cNvSpPr txBox="1"/>
           <p:nvPr>
             <p:ph type="sldNum" sz="quarter" idx="4294967295"/>
@@ -6769,7 +6769,7 @@
       </p:sp>
       <p:sp>
         <p:nvSpPr>
-          <p:cNvPr id="288" name="주요 기능 - VGGNet &amp; Mobile Net V2"/>
+          <p:cNvPr id="286" name="주요 기능 - VGGNet &amp; Mobile Net V2"/>
           <p:cNvSpPr txBox="1"/>
           <p:nvPr>
             <p:ph type="title"/>
@@ -6803,7 +6803,7 @@
       </p:sp>
       <p:sp>
         <p:nvSpPr>
-          <p:cNvPr id="289" name="선"/>
+          <p:cNvPr id="287" name="선"/>
           <p:cNvSpPr/>
           <p:nvPr/>
         </p:nvSpPr>
@@ -6838,7 +6838,7 @@
       </p:sp>
       <p:sp>
         <p:nvSpPr>
-          <p:cNvPr id="290" name="TextBox 1"/>
+          <p:cNvPr id="288" name="TextBox 1"/>
           <p:cNvSpPr txBox="1"/>
           <p:nvPr/>
         </p:nvSpPr>
@@ -7172,7 +7172,7 @@
       </p:grpSpPr>
       <p:sp>
         <p:nvSpPr>
-          <p:cNvPr id="292" name="슬라이드 번호"/>
+          <p:cNvPr id="290" name="슬라이드 번호"/>
           <p:cNvSpPr txBox="1"/>
           <p:nvPr>
             <p:ph type="sldNum" sz="quarter" idx="4294967295"/>
@@ -7203,7 +7203,7 @@
       </p:sp>
       <p:sp>
         <p:nvSpPr>
-          <p:cNvPr id="293" name="주요 기능 - VGGNet &amp; Mobile Net V2"/>
+          <p:cNvPr id="291" name="주요 기능 - VGGNet &amp; Mobile Net V2"/>
           <p:cNvSpPr txBox="1"/>
           <p:nvPr>
             <p:ph type="title"/>
@@ -7237,7 +7237,7 @@
       </p:sp>
       <p:sp>
         <p:nvSpPr>
-          <p:cNvPr id="294" name="선"/>
+          <p:cNvPr id="292" name="선"/>
           <p:cNvSpPr/>
           <p:nvPr/>
         </p:nvSpPr>
@@ -7272,7 +7272,7 @@
       </p:sp>
       <p:sp>
         <p:nvSpPr>
-          <p:cNvPr id="295" name="직사각형 5"/>
+          <p:cNvPr id="293" name="직사각형 5"/>
           <p:cNvSpPr/>
           <p:nvPr/>
         </p:nvSpPr>
@@ -7311,7 +7311,7 @@
       </p:sp>
       <p:grpSp>
         <p:nvGrpSpPr>
-          <p:cNvPr id="298" name="그룹 6"/>
+          <p:cNvPr id="296" name="그룹 6"/>
           <p:cNvGrpSpPr/>
           <p:nvPr/>
         </p:nvGrpSpPr>
@@ -7325,7 +7325,7 @@
         </p:grpSpPr>
         <p:sp>
           <p:nvSpPr>
-            <p:cNvPr id="296" name="직사각형 7"/>
+            <p:cNvPr id="294" name="직사각형 7"/>
             <p:cNvSpPr/>
             <p:nvPr/>
           </p:nvSpPr>
@@ -7370,7 +7370,7 @@
         </p:sp>
         <p:sp>
           <p:nvSpPr>
-            <p:cNvPr id="297" name="TextBox 8"/>
+            <p:cNvPr id="295" name="TextBox 8"/>
             <p:cNvSpPr txBox="1"/>
             <p:nvPr/>
           </p:nvSpPr>
@@ -7494,7 +7494,7 @@
       </p:grpSp>
       <p:sp>
         <p:nvSpPr>
-          <p:cNvPr id="299" name="TextBox 1"/>
+          <p:cNvPr id="297" name="TextBox 1"/>
           <p:cNvSpPr txBox="1"/>
           <p:nvPr/>
         </p:nvSpPr>
@@ -7828,7 +7828,7 @@
       </p:grpSpPr>
       <p:sp>
         <p:nvSpPr>
-          <p:cNvPr id="301" name="슬라이드 번호"/>
+          <p:cNvPr id="299" name="슬라이드 번호"/>
           <p:cNvSpPr txBox="1"/>
           <p:nvPr>
             <p:ph type="sldNum" sz="quarter" idx="4294967295"/>
@@ -7859,7 +7859,7 @@
       </p:sp>
       <p:sp>
         <p:nvSpPr>
-          <p:cNvPr id="302" name="멘토링 - Modeling"/>
+          <p:cNvPr id="300" name="멘토링 - Modeling"/>
           <p:cNvSpPr txBox="1"/>
           <p:nvPr>
             <p:ph type="title"/>
@@ -7890,7 +7890,7 @@
       </p:sp>
       <p:sp>
         <p:nvSpPr>
-          <p:cNvPr id="303" name="선"/>
+          <p:cNvPr id="301" name="선"/>
           <p:cNvSpPr/>
           <p:nvPr/>
         </p:nvSpPr>
@@ -7925,7 +7925,7 @@
       </p:sp>
       <p:pic>
         <p:nvPicPr>
-          <p:cNvPr id="304" name="이미지" descr="이미지"/>
+          <p:cNvPr id="302" name="이미지" descr="이미지"/>
           <p:cNvPicPr>
             <a:picLocks noChangeAspect="1"/>
           </p:cNvPicPr>
@@ -7954,7 +7954,7 @@
       </p:pic>
       <p:pic>
         <p:nvPicPr>
-          <p:cNvPr id="305" name="이미지" descr="이미지"/>
+          <p:cNvPr id="303" name="이미지" descr="이미지"/>
           <p:cNvPicPr>
             <a:picLocks noChangeAspect="1"/>
           </p:cNvPicPr>
@@ -7983,7 +7983,7 @@
       </p:pic>
       <p:sp>
         <p:nvSpPr>
-          <p:cNvPr id="306" name="팀이 사용하고 있는 Trello를 같이 보면서 진행사항을 모두 체크해주셨고, 이로 인해 각 항목별로 멘토님의 조언을 받을 수 있었다."/>
+          <p:cNvPr id="304" name="팀이 사용하고 있는 Trello를 같이 보면서 진행사항을 모두 체크해주셨고, 이로 인해 각 항목별로 멘토님의 조언을 받을 수 있었다."/>
           <p:cNvSpPr txBox="1"/>
           <p:nvPr/>
         </p:nvSpPr>
@@ -8034,7 +8034,7 @@
       </p:sp>
       <p:sp>
         <p:nvSpPr>
-          <p:cNvPr id="307" name="Modeling 방향에 대해서도 많은 조언"/>
+          <p:cNvPr id="305" name="Modeling 방향에 대해서도 많은 조언"/>
           <p:cNvSpPr txBox="1"/>
           <p:nvPr/>
         </p:nvSpPr>
@@ -8101,7 +8101,7 @@
       </p:sp>
       <p:pic>
         <p:nvPicPr>
-          <p:cNvPr id="308" name="이미지" descr="이미지"/>
+          <p:cNvPr id="306" name="이미지" descr="이미지"/>
           <p:cNvPicPr>
             <a:picLocks noChangeAspect="1"/>
           </p:cNvPicPr>
@@ -8130,7 +8130,7 @@
       </p:pic>
       <p:sp>
         <p:nvSpPr>
-          <p:cNvPr id="309" name="그 밖에도 실무에서 사용하는 유용한 정보들에 대해서도 많은 조언"/>
+          <p:cNvPr id="307" name="그 밖에도 실무에서 사용하는 유용한 정보들에 대해서도 많은 조언"/>
           <p:cNvSpPr txBox="1"/>
           <p:nvPr/>
         </p:nvSpPr>
@@ -8207,7 +8207,7 @@
       </p:grpSpPr>
       <p:sp>
         <p:nvSpPr>
-          <p:cNvPr id="311" name="슬라이드 번호"/>
+          <p:cNvPr id="309" name="슬라이드 번호"/>
           <p:cNvSpPr txBox="1"/>
           <p:nvPr>
             <p:ph type="sldNum" sz="quarter" idx="4294967295"/>
@@ -8238,7 +8238,7 @@
       </p:sp>
       <p:sp>
         <p:nvSpPr>
-          <p:cNvPr id="312" name="기대 효과"/>
+          <p:cNvPr id="310" name="기대 효과"/>
           <p:cNvSpPr txBox="1"/>
           <p:nvPr>
             <p:ph type="title"/>
@@ -8266,7 +8266,7 @@
       </p:sp>
       <p:sp>
         <p:nvSpPr>
-          <p:cNvPr id="313" name="도형"/>
+          <p:cNvPr id="311" name="도형"/>
           <p:cNvSpPr/>
           <p:nvPr/>
         </p:nvSpPr>
@@ -8376,7 +8376,7 @@
       </p:sp>
       <p:sp>
         <p:nvSpPr>
-          <p:cNvPr id="314" name="도형"/>
+          <p:cNvPr id="312" name="도형"/>
           <p:cNvSpPr/>
           <p:nvPr/>
         </p:nvSpPr>
@@ -8486,7 +8486,7 @@
       </p:sp>
       <p:sp>
         <p:nvSpPr>
-          <p:cNvPr id="315" name="삼각형"/>
+          <p:cNvPr id="313" name="삼각형"/>
           <p:cNvSpPr/>
           <p:nvPr/>
         </p:nvSpPr>
@@ -8556,7 +8556,7 @@
       </p:sp>
       <p:sp>
         <p:nvSpPr>
-          <p:cNvPr id="316" name="삼각형"/>
+          <p:cNvPr id="314" name="삼각형"/>
           <p:cNvSpPr/>
           <p:nvPr/>
         </p:nvSpPr>
@@ -8626,7 +8626,7 @@
       </p:sp>
       <p:sp>
         <p:nvSpPr>
-          <p:cNvPr id="317" name="선"/>
+          <p:cNvPr id="315" name="선"/>
           <p:cNvSpPr/>
           <p:nvPr/>
         </p:nvSpPr>
@@ -8661,7 +8661,7 @@
       </p:sp>
       <p:sp>
         <p:nvSpPr>
-          <p:cNvPr id="318" name="자신의 얼굴형에 대한 정확한 인지"/>
+          <p:cNvPr id="316" name="자신의 얼굴형에 대한 정확한 인지"/>
           <p:cNvSpPr txBox="1"/>
           <p:nvPr/>
         </p:nvSpPr>
@@ -8735,7 +8735,7 @@
       </p:sp>
       <p:sp>
         <p:nvSpPr>
-          <p:cNvPr id="319" name="선"/>
+          <p:cNvPr id="317" name="선"/>
           <p:cNvSpPr/>
           <p:nvPr/>
         </p:nvSpPr>
@@ -8770,7 +8770,7 @@
       </p:sp>
       <p:sp>
         <p:nvSpPr>
-          <p:cNvPr id="320" name="자신의 얼굴형에 어울리는 헤어스타일 시도"/>
+          <p:cNvPr id="318" name="자신의 얼굴형에 어울리는 헤어스타일 시도"/>
           <p:cNvSpPr txBox="1"/>
           <p:nvPr/>
         </p:nvSpPr>
@@ -8844,7 +8844,7 @@
       </p:sp>
       <p:sp>
         <p:nvSpPr>
-          <p:cNvPr id="321" name="AI 접근성 향상"/>
+          <p:cNvPr id="319" name="AI 접근성 향상"/>
           <p:cNvSpPr txBox="1"/>
           <p:nvPr/>
         </p:nvSpPr>
@@ -8895,7 +8895,7 @@
       </p:sp>
       <p:sp>
         <p:nvSpPr>
-          <p:cNvPr id="322" name="선"/>
+          <p:cNvPr id="320" name="선"/>
           <p:cNvSpPr/>
           <p:nvPr/>
         </p:nvSpPr>
@@ -8956,7 +8956,7 @@
       </p:grpSpPr>
       <p:sp>
         <p:nvSpPr>
-          <p:cNvPr id="324" name="직사각형"/>
+          <p:cNvPr id="322" name="직사각형"/>
           <p:cNvSpPr/>
           <p:nvPr/>
         </p:nvSpPr>
@@ -8995,7 +8995,7 @@
       </p:sp>
       <p:sp>
         <p:nvSpPr>
-          <p:cNvPr id="325" name="선"/>
+          <p:cNvPr id="323" name="선"/>
           <p:cNvSpPr/>
           <p:nvPr/>
         </p:nvSpPr>
@@ -9030,7 +9030,7 @@
       </p:sp>
       <p:sp>
         <p:nvSpPr>
-          <p:cNvPr id="326" name="Thank you"/>
+          <p:cNvPr id="324" name="Thank you"/>
           <p:cNvSpPr txBox="1"/>
           <p:nvPr>
             <p:ph type="title"/>
@@ -9124,73 +9124,7 @@
       </p:sp>
       <p:sp>
         <p:nvSpPr>
-          <p:cNvPr id="51" name="산학 기업 요구 사항…"/>
-          <p:cNvSpPr txBox="1"/>
-          <p:nvPr/>
-        </p:nvSpPr>
-        <p:spPr>
-          <a:xfrm>
-            <a:off x="11451519" y="4552846"/>
-            <a:ext cx="4000241" cy="1367431"/>
-          </a:xfrm>
-          <a:prstGeom prst="rect">
-            <a:avLst/>
-          </a:prstGeom>
-          <a:ln w="12700">
-            <a:miter lim="400000"/>
-          </a:ln>
-          <a:extLst>
-            <a:ext uri="{C572A759-6A51-4108-AA02-DFA0A04FC94B}">
-              <ma14:wrappingTextBoxFlag xmlns:ma14="http://schemas.microsoft.com/office/mac/drawingml/2011/main" val="1"/>
-            </a:ext>
-          </a:extLst>
-        </p:spPr>
-        <p:txBody>
-          <a:bodyPr lIns="71436" tIns="71436" rIns="71436" bIns="71436">
-            <a:normAutofit fontScale="100000" lnSpcReduction="0"/>
-          </a:bodyPr>
-          <a:lstStyle/>
-          <a:p>
-            <a:pPr marL="332613" indent="-332613" defTabSz="2199625">
-              <a:lnSpc>
-                <a:spcPct val="116999"/>
-              </a:lnSpc>
-              <a:buSzPct val="123000"/>
-              <a:buFont typeface="Arial"/>
-              <a:buChar char="•"/>
-              <a:defRPr b="1" sz="2910">
-                <a:solidFill>
-                  <a:srgbClr val="818779"/>
-                </a:solidFill>
-              </a:defRPr>
-            </a:pPr>
-            <a:r>
-              <a:t>산학 기업 요구 사항</a:t>
-            </a:r>
-          </a:p>
-          <a:p>
-            <a:pPr marL="332613" indent="-332613" defTabSz="2199625">
-              <a:lnSpc>
-                <a:spcPct val="116999"/>
-              </a:lnSpc>
-              <a:buSzPct val="123000"/>
-              <a:buFont typeface="Arial"/>
-              <a:buChar char="•"/>
-              <a:defRPr b="1" sz="2910">
-                <a:solidFill>
-                  <a:srgbClr val="818779"/>
-                </a:solidFill>
-              </a:defRPr>
-            </a:pPr>
-            <a:r>
-              <a:t>프로젝트 개요 및 목표</a:t>
-            </a:r>
-          </a:p>
-        </p:txBody>
-      </p:sp>
-      <p:sp>
-        <p:nvSpPr>
-          <p:cNvPr id="52" name="1."/>
+          <p:cNvPr id="51" name="1."/>
           <p:cNvSpPr txBox="1"/>
           <p:nvPr/>
         </p:nvSpPr>
@@ -9241,7 +9175,7 @@
       </p:sp>
       <p:sp>
         <p:nvSpPr>
-          <p:cNvPr id="53" name="팀원 소개"/>
+          <p:cNvPr id="52" name="팀원 소개"/>
           <p:cNvSpPr txBox="1"/>
           <p:nvPr/>
         </p:nvSpPr>
@@ -9288,7 +9222,7 @@
       </p:sp>
       <p:sp>
         <p:nvSpPr>
-          <p:cNvPr id="54" name="2."/>
+          <p:cNvPr id="53" name="2."/>
           <p:cNvSpPr txBox="1"/>
           <p:nvPr/>
         </p:nvSpPr>
@@ -9339,7 +9273,7 @@
       </p:sp>
       <p:sp>
         <p:nvSpPr>
-          <p:cNvPr id="55" name="3."/>
+          <p:cNvPr id="54" name="3."/>
           <p:cNvSpPr txBox="1"/>
           <p:nvPr/>
         </p:nvSpPr>
@@ -9390,7 +9324,7 @@
       </p:sp>
       <p:sp>
         <p:nvSpPr>
-          <p:cNvPr id="56" name="4."/>
+          <p:cNvPr id="55" name="4."/>
           <p:cNvSpPr txBox="1"/>
           <p:nvPr/>
         </p:nvSpPr>
@@ -9441,7 +9375,7 @@
       </p:sp>
       <p:sp>
         <p:nvSpPr>
-          <p:cNvPr id="57" name="슬라이드 번호"/>
+          <p:cNvPr id="56" name="슬라이드 번호"/>
           <p:cNvSpPr txBox="1"/>
           <p:nvPr>
             <p:ph type="sldNum" sz="quarter" idx="4294967295"/>
@@ -9472,7 +9406,7 @@
       </p:sp>
       <p:sp>
         <p:nvSpPr>
-          <p:cNvPr id="58" name="5."/>
+          <p:cNvPr id="57" name="5."/>
           <p:cNvSpPr txBox="1"/>
           <p:nvPr/>
         </p:nvSpPr>
@@ -9523,7 +9457,7 @@
       </p:sp>
       <p:sp>
         <p:nvSpPr>
-          <p:cNvPr id="59" name="프로젝트 개요"/>
+          <p:cNvPr id="58" name="프로젝트 개요"/>
           <p:cNvSpPr txBox="1"/>
           <p:nvPr/>
         </p:nvSpPr>
@@ -9570,7 +9504,7 @@
       </p:sp>
       <p:sp>
         <p:nvSpPr>
-          <p:cNvPr id="60" name="시스템 구조도"/>
+          <p:cNvPr id="59" name="시스템 구조도"/>
           <p:cNvSpPr txBox="1"/>
           <p:nvPr/>
         </p:nvSpPr>
@@ -9617,7 +9551,7 @@
       </p:sp>
       <p:sp>
         <p:nvSpPr>
-          <p:cNvPr id="61" name="주요 기능"/>
+          <p:cNvPr id="60" name="주요 기능"/>
           <p:cNvSpPr txBox="1"/>
           <p:nvPr/>
         </p:nvSpPr>
@@ -9664,7 +9598,7 @@
       </p:sp>
       <p:sp>
         <p:nvSpPr>
-          <p:cNvPr id="62" name="기대효과"/>
+          <p:cNvPr id="61" name="기대효과"/>
           <p:cNvSpPr txBox="1"/>
           <p:nvPr/>
         </p:nvSpPr>
@@ -9704,98 +9638,14 @@
           <a:p>
             <a:pPr/>
             <a:r>
-              <a:t>문제점 및 해결</a:t>
+              <a:t>멘토링</a:t>
             </a:r>
           </a:p>
         </p:txBody>
       </p:sp>
       <p:sp>
         <p:nvSpPr>
-          <p:cNvPr id="63" name="Dataset 구축  Labeling &amp; Processing…"/>
-          <p:cNvSpPr txBox="1"/>
-          <p:nvPr/>
-        </p:nvSpPr>
-        <p:spPr>
-          <a:xfrm>
-            <a:off x="12072823" y="7780579"/>
-            <a:ext cx="2757630" cy="1535118"/>
-          </a:xfrm>
-          <a:prstGeom prst="rect">
-            <a:avLst/>
-          </a:prstGeom>
-          <a:ln w="12700">
-            <a:miter lim="400000"/>
-          </a:ln>
-          <a:extLst>
-            <a:ext uri="{C572A759-6A51-4108-AA02-DFA0A04FC94B}">
-              <ma14:wrappingTextBoxFlag xmlns:ma14="http://schemas.microsoft.com/office/mac/drawingml/2011/main" val="1"/>
-            </a:ext>
-          </a:extLst>
-        </p:spPr>
-        <p:txBody>
-          <a:bodyPr lIns="71436" tIns="71436" rIns="71436" bIns="71436">
-            <a:normAutofit fontScale="100000" lnSpcReduction="0"/>
-          </a:bodyPr>
-          <a:lstStyle/>
-          <a:p>
-            <a:pPr marL="342900" indent="-342900">
-              <a:lnSpc>
-                <a:spcPct val="104000"/>
-              </a:lnSpc>
-              <a:buSzPct val="123000"/>
-              <a:buFont typeface="Arial"/>
-              <a:buChar char="•"/>
-              <a:defRPr b="1" sz="3000">
-                <a:solidFill>
-                  <a:srgbClr val="818779"/>
-                </a:solidFill>
-              </a:defRPr>
-            </a:pPr>
-            <a:r>
-              <a:t>변경 사항</a:t>
-            </a:r>
-          </a:p>
-          <a:p>
-            <a:pPr marL="342900" indent="-342900">
-              <a:lnSpc>
-                <a:spcPct val="104000"/>
-              </a:lnSpc>
-              <a:buSzPct val="123000"/>
-              <a:buFont typeface="Arial"/>
-              <a:buChar char="•"/>
-              <a:defRPr b="1" sz="3000">
-                <a:solidFill>
-                  <a:srgbClr val="818779"/>
-                </a:solidFill>
-              </a:defRPr>
-            </a:pPr>
-            <a:r>
-              <a:t>Dataset 구축</a:t>
-            </a:r>
-          </a:p>
-          <a:p>
-            <a:pPr marL="342900" indent="-342900">
-              <a:lnSpc>
-                <a:spcPct val="104000"/>
-              </a:lnSpc>
-              <a:buSzPct val="123000"/>
-              <a:buFont typeface="Arial"/>
-              <a:buChar char="•"/>
-              <a:defRPr b="1" sz="3000">
-                <a:solidFill>
-                  <a:srgbClr val="818779"/>
-                </a:solidFill>
-              </a:defRPr>
-            </a:pPr>
-            <a:r>
-              <a:t>모델 개발</a:t>
-            </a:r>
-          </a:p>
-        </p:txBody>
-      </p:sp>
-      <p:sp>
-        <p:nvSpPr>
-          <p:cNvPr id="64" name="선"/>
+          <p:cNvPr id="62" name="선"/>
           <p:cNvSpPr/>
           <p:nvPr/>
         </p:nvSpPr>
@@ -9830,7 +9680,7 @@
       </p:sp>
       <p:sp>
         <p:nvSpPr>
-          <p:cNvPr id="65" name="5."/>
+          <p:cNvPr id="63" name="5."/>
           <p:cNvSpPr txBox="1"/>
           <p:nvPr/>
         </p:nvSpPr>
@@ -9881,7 +9731,7 @@
       </p:sp>
       <p:sp>
         <p:nvSpPr>
-          <p:cNvPr id="66" name="기대효과"/>
+          <p:cNvPr id="64" name="기대효과"/>
           <p:cNvSpPr txBox="1"/>
           <p:nvPr/>
         </p:nvSpPr>
@@ -9921,7 +9771,7 @@
           <a:p>
             <a:pPr/>
             <a:r>
-              <a:t>기타</a:t>
+              <a:t>기대효과</a:t>
             </a:r>
           </a:p>
         </p:txBody>
@@ -9954,7 +9804,7 @@
       </p:grpSpPr>
       <p:sp>
         <p:nvSpPr>
-          <p:cNvPr id="68" name="슬라이드 번호"/>
+          <p:cNvPr id="66" name="슬라이드 번호"/>
           <p:cNvSpPr txBox="1"/>
           <p:nvPr>
             <p:ph type="sldNum" sz="quarter" idx="4294967295"/>
@@ -9985,7 +9835,7 @@
       </p:sp>
       <p:sp>
         <p:nvSpPr>
-          <p:cNvPr id="69" name="팀원 소개"/>
+          <p:cNvPr id="67" name="팀원 소개"/>
           <p:cNvSpPr txBox="1"/>
           <p:nvPr>
             <p:ph type="title"/>
@@ -10013,7 +9863,7 @@
       </p:sp>
       <p:sp>
         <p:nvSpPr>
-          <p:cNvPr id="70" name="원"/>
+          <p:cNvPr id="68" name="원"/>
           <p:cNvSpPr/>
           <p:nvPr/>
         </p:nvSpPr>
@@ -10052,7 +9902,7 @@
       </p:sp>
       <p:pic>
         <p:nvPicPr>
-          <p:cNvPr id="71" name="이미지" descr="이미지"/>
+          <p:cNvPr id="69" name="이미지" descr="이미지"/>
           <p:cNvPicPr>
             <a:picLocks noChangeAspect="1"/>
           </p:cNvPicPr>
@@ -10081,7 +9931,7 @@
       </p:pic>
       <p:sp>
         <p:nvSpPr>
-          <p:cNvPr id="72" name="원"/>
+          <p:cNvPr id="70" name="원"/>
           <p:cNvSpPr/>
           <p:nvPr/>
         </p:nvSpPr>
@@ -10120,7 +9970,7 @@
       </p:sp>
       <p:sp>
         <p:nvSpPr>
-          <p:cNvPr id="73" name="원"/>
+          <p:cNvPr id="71" name="원"/>
           <p:cNvSpPr/>
           <p:nvPr/>
         </p:nvSpPr>
@@ -10159,7 +10009,7 @@
       </p:sp>
       <p:sp>
         <p:nvSpPr>
-          <p:cNvPr id="74" name="원"/>
+          <p:cNvPr id="72" name="원"/>
           <p:cNvSpPr/>
           <p:nvPr/>
         </p:nvSpPr>
@@ -10198,7 +10048,7 @@
       </p:sp>
       <p:sp>
         <p:nvSpPr>
-          <p:cNvPr id="75" name="원"/>
+          <p:cNvPr id="73" name="원"/>
           <p:cNvSpPr/>
           <p:nvPr/>
         </p:nvSpPr>
@@ -10237,7 +10087,7 @@
       </p:sp>
       <p:pic>
         <p:nvPicPr>
-          <p:cNvPr id="76" name="이미지" descr="이미지"/>
+          <p:cNvPr id="74" name="이미지" descr="이미지"/>
           <p:cNvPicPr>
             <a:picLocks noChangeAspect="1"/>
           </p:cNvPicPr>
@@ -10266,7 +10116,7 @@
       </p:pic>
       <p:pic>
         <p:nvPicPr>
-          <p:cNvPr id="77" name="이미지" descr="이미지"/>
+          <p:cNvPr id="75" name="이미지" descr="이미지"/>
           <p:cNvPicPr>
             <a:picLocks noChangeAspect="1"/>
           </p:cNvPicPr>
@@ -10295,7 +10145,7 @@
       </p:pic>
       <p:pic>
         <p:nvPicPr>
-          <p:cNvPr id="78" name="이미지" descr="이미지"/>
+          <p:cNvPr id="76" name="이미지" descr="이미지"/>
           <p:cNvPicPr>
             <a:picLocks noChangeAspect="1"/>
           </p:cNvPicPr>
@@ -10465,7 +10315,7 @@
       </p:pic>
       <p:pic>
         <p:nvPicPr>
-          <p:cNvPr id="79" name="이미지" descr="이미지"/>
+          <p:cNvPr id="77" name="이미지" descr="이미지"/>
           <p:cNvPicPr>
             <a:picLocks noChangeAspect="1"/>
           </p:cNvPicPr>
@@ -10615,7 +10465,7 @@
       </p:pic>
       <p:sp>
         <p:nvSpPr>
-          <p:cNvPr id="80" name="오규석"/>
+          <p:cNvPr id="78" name="오규석"/>
           <p:cNvSpPr txBox="1"/>
           <p:nvPr/>
         </p:nvSpPr>
@@ -10666,7 +10516,7 @@
       </p:sp>
       <p:sp>
         <p:nvSpPr>
-          <p:cNvPr id="81" name="양성민"/>
+          <p:cNvPr id="79" name="양성민"/>
           <p:cNvSpPr txBox="1"/>
           <p:nvPr/>
         </p:nvSpPr>
@@ -10717,7 +10567,7 @@
       </p:sp>
       <p:sp>
         <p:nvSpPr>
-          <p:cNvPr id="82" name="유선종"/>
+          <p:cNvPr id="80" name="유선종"/>
           <p:cNvSpPr txBox="1"/>
           <p:nvPr/>
         </p:nvSpPr>
@@ -10768,7 +10618,7 @@
       </p:sp>
       <p:sp>
         <p:nvSpPr>
-          <p:cNvPr id="83" name="최나라"/>
+          <p:cNvPr id="81" name="최나라"/>
           <p:cNvSpPr txBox="1"/>
           <p:nvPr/>
         </p:nvSpPr>
@@ -10819,7 +10669,7 @@
       </p:sp>
       <p:sp>
         <p:nvSpPr>
-          <p:cNvPr id="84" name="차윤성"/>
+          <p:cNvPr id="82" name="차윤성"/>
           <p:cNvSpPr txBox="1"/>
           <p:nvPr/>
         </p:nvSpPr>
@@ -10870,7 +10720,7 @@
       </p:sp>
       <p:sp>
         <p:nvSpPr>
-          <p:cNvPr id="85" name="Project Manager…"/>
+          <p:cNvPr id="83" name="Project Manager…"/>
           <p:cNvSpPr txBox="1"/>
           <p:nvPr/>
         </p:nvSpPr>
@@ -10938,7 +10788,7 @@
       </p:sp>
       <p:sp>
         <p:nvSpPr>
-          <p:cNvPr id="86" name="Object Detection Data Labeling"/>
+          <p:cNvPr id="84" name="Object Detection Data Labeling"/>
           <p:cNvSpPr txBox="1"/>
           <p:nvPr/>
         </p:nvSpPr>
@@ -11025,7 +10875,7 @@
       </p:sp>
       <p:sp>
         <p:nvSpPr>
-          <p:cNvPr id="87" name="Object Detection…"/>
+          <p:cNvPr id="85" name="Object Detection…"/>
           <p:cNvSpPr txBox="1"/>
           <p:nvPr/>
         </p:nvSpPr>
@@ -11093,7 +10943,7 @@
       </p:sp>
       <p:sp>
         <p:nvSpPr>
-          <p:cNvPr id="88" name="Object Detection"/>
+          <p:cNvPr id="86" name="Object Detection"/>
           <p:cNvSpPr txBox="1"/>
           <p:nvPr/>
         </p:nvSpPr>
@@ -11143,7 +10993,7 @@
       </p:sp>
       <p:sp>
         <p:nvSpPr>
-          <p:cNvPr id="89" name="Front-End"/>
+          <p:cNvPr id="87" name="Front-End"/>
           <p:cNvSpPr txBox="1"/>
           <p:nvPr/>
         </p:nvSpPr>
@@ -11194,7 +11044,7 @@
       </p:sp>
       <p:sp>
         <p:nvSpPr>
-          <p:cNvPr id="90" name="선"/>
+          <p:cNvPr id="88" name="선"/>
           <p:cNvSpPr/>
           <p:nvPr/>
         </p:nvSpPr>
@@ -11255,7 +11105,7 @@
       </p:grpSpPr>
       <p:sp>
         <p:nvSpPr>
-          <p:cNvPr id="92" name="프로젝트 개요 - 산학 요구 사항"/>
+          <p:cNvPr id="90" name="프로젝트 개요 - 산학 요구 사항"/>
           <p:cNvSpPr txBox="1"/>
           <p:nvPr>
             <p:ph type="title"/>
@@ -11283,7 +11133,7 @@
       </p:sp>
       <p:sp>
         <p:nvSpPr>
-          <p:cNvPr id="93" name="슬라이드 번호"/>
+          <p:cNvPr id="91" name="슬라이드 번호"/>
           <p:cNvSpPr txBox="1"/>
           <p:nvPr>
             <p:ph type="sldNum" sz="quarter" idx="4294967295"/>
@@ -11314,7 +11164,7 @@
       </p:sp>
       <p:sp>
         <p:nvSpPr>
-          <p:cNvPr id="94" name="도형"/>
+          <p:cNvPr id="92" name="도형"/>
           <p:cNvSpPr/>
           <p:nvPr/>
         </p:nvSpPr>
@@ -11406,7 +11256,7 @@
       </p:sp>
       <p:sp>
         <p:nvSpPr>
-          <p:cNvPr id="95" name="도형"/>
+          <p:cNvPr id="93" name="도형"/>
           <p:cNvSpPr/>
           <p:nvPr/>
         </p:nvSpPr>
@@ -11498,7 +11348,7 @@
       </p:sp>
       <p:sp>
         <p:nvSpPr>
-          <p:cNvPr id="96" name="도형"/>
+          <p:cNvPr id="94" name="도형"/>
           <p:cNvSpPr/>
           <p:nvPr/>
         </p:nvSpPr>
@@ -11575,7 +11425,7 @@
       </p:sp>
       <p:sp>
         <p:nvSpPr>
-          <p:cNvPr id="97" name="도형"/>
+          <p:cNvPr id="95" name="도형"/>
           <p:cNvSpPr/>
           <p:nvPr/>
         </p:nvSpPr>
@@ -11667,7 +11517,7 @@
       </p:sp>
       <p:sp>
         <p:nvSpPr>
-          <p:cNvPr id="98" name="도형"/>
+          <p:cNvPr id="96" name="도형"/>
           <p:cNvSpPr/>
           <p:nvPr/>
         </p:nvSpPr>
@@ -11759,7 +11609,7 @@
       </p:sp>
       <p:sp>
         <p:nvSpPr>
-          <p:cNvPr id="99" name="도형"/>
+          <p:cNvPr id="97" name="도형"/>
           <p:cNvSpPr/>
           <p:nvPr/>
         </p:nvSpPr>
@@ -11836,14 +11686,14 @@
       </p:sp>
       <p:sp>
         <p:nvSpPr>
-          <p:cNvPr id="100" name="AI 교육용 서비스"/>
+          <p:cNvPr id="98" name="AI 교육용 서비스"/>
           <p:cNvSpPr txBox="1"/>
           <p:nvPr/>
         </p:nvSpPr>
         <p:spPr>
           <a:xfrm>
-            <a:off x="6560296" y="7438943"/>
-            <a:ext cx="4492173" cy="1176635"/>
+            <a:off x="7235969" y="7438943"/>
+            <a:ext cx="4492174" cy="1176635"/>
           </a:xfrm>
           <a:prstGeom prst="rect">
             <a:avLst/>
@@ -11863,18 +11713,14 @@
           </a:bodyPr>
           <a:lstStyle/>
           <a:p>
-            <a:pPr defTabSz="2048204">
+            <a:pPr defTabSz="1884347">
               <a:lnSpc>
                 <a:spcPct val="120000"/>
               </a:lnSpc>
-              <a:defRPr sz="3500">
+              <a:defRPr sz="3220">
                 <a:solidFill>
                   <a:srgbClr val="838383"/>
                 </a:solidFill>
-                <a:latin typeface="궁서체 일반체"/>
-                <a:ea typeface="궁서체 일반체"/>
-                <a:cs typeface="궁서체 일반체"/>
-                <a:sym typeface="궁서체 일반체"/>
               </a:defRPr>
             </a:pPr>
             <a:r>
@@ -11889,7 +11735,7 @@
       </p:sp>
       <p:sp>
         <p:nvSpPr>
-          <p:cNvPr id="101" name="Object Detection"/>
+          <p:cNvPr id="99" name="Object Detection"/>
           <p:cNvSpPr txBox="1"/>
           <p:nvPr/>
         </p:nvSpPr>
@@ -11915,18 +11761,14 @@
             <a:normAutofit fontScale="100000" lnSpcReduction="0"/>
           </a:bodyPr>
           <a:lstStyle>
-            <a:lvl1pPr defTabSz="2340804">
+            <a:lvl1pPr defTabSz="2130132">
               <a:lnSpc>
                 <a:spcPct val="120000"/>
               </a:lnSpc>
-              <a:defRPr sz="4000">
+              <a:defRPr sz="3640">
                 <a:solidFill>
                   <a:srgbClr val="838383"/>
                 </a:solidFill>
-                <a:latin typeface="궁서체 일반체"/>
-                <a:ea typeface="궁서체 일반체"/>
-                <a:cs typeface="궁서체 일반체"/>
-                <a:sym typeface="궁서체 일반체"/>
               </a:defRPr>
             </a:lvl1pPr>
           </a:lstStyle>
@@ -11940,7 +11782,7 @@
       </p:sp>
       <p:sp>
         <p:nvSpPr>
-          <p:cNvPr id="102" name="선"/>
+          <p:cNvPr id="100" name="선"/>
           <p:cNvSpPr/>
           <p:nvPr/>
         </p:nvSpPr>
@@ -12001,7 +11843,7 @@
       </p:grpSpPr>
       <p:sp>
         <p:nvSpPr>
-          <p:cNvPr id="104" name="프로젝트 개요 - 목표"/>
+          <p:cNvPr id="102" name="프로젝트 개요 - 목표"/>
           <p:cNvSpPr txBox="1"/>
           <p:nvPr>
             <p:ph type="title"/>
@@ -12029,7 +11871,7 @@
       </p:sp>
       <p:sp>
         <p:nvSpPr>
-          <p:cNvPr id="105" name="슬라이드 번호"/>
+          <p:cNvPr id="103" name="슬라이드 번호"/>
           <p:cNvSpPr txBox="1"/>
           <p:nvPr>
             <p:ph type="sldNum" sz="quarter" idx="4294967295"/>
@@ -12060,7 +11902,7 @@
       </p:sp>
       <p:sp>
         <p:nvSpPr>
-          <p:cNvPr id="106" name="삼각형"/>
+          <p:cNvPr id="104" name="삼각형"/>
           <p:cNvSpPr/>
           <p:nvPr/>
         </p:nvSpPr>
@@ -12130,7 +11972,7 @@
       </p:sp>
       <p:sp>
         <p:nvSpPr>
-          <p:cNvPr id="107" name="Face Landmark…"/>
+          <p:cNvPr id="105" name="Face Landmark…"/>
           <p:cNvSpPr txBox="1"/>
           <p:nvPr/>
         </p:nvSpPr>
@@ -12198,7 +12040,7 @@
       </p:sp>
       <p:sp>
         <p:nvSpPr>
-          <p:cNvPr id="108" name="Classify Facialization"/>
+          <p:cNvPr id="106" name="Classify Facialization"/>
           <p:cNvSpPr txBox="1"/>
           <p:nvPr/>
         </p:nvSpPr>
@@ -12249,7 +12091,7 @@
       </p:sp>
       <p:sp>
         <p:nvSpPr>
-          <p:cNvPr id="109" name="Hairstyle recommendation"/>
+          <p:cNvPr id="107" name="Hairstyle recommendation"/>
           <p:cNvSpPr txBox="1"/>
           <p:nvPr/>
         </p:nvSpPr>
@@ -12300,7 +12142,7 @@
       </p:sp>
       <p:sp>
         <p:nvSpPr>
-          <p:cNvPr id="110" name="Goal"/>
+          <p:cNvPr id="108" name="Goal"/>
           <p:cNvSpPr txBox="1"/>
           <p:nvPr/>
         </p:nvSpPr>
@@ -12351,7 +12193,7 @@
       </p:sp>
       <p:sp>
         <p:nvSpPr>
-          <p:cNvPr id="111" name="얼굴형 기반 헤어스타일 추천"/>
+          <p:cNvPr id="109" name="얼굴형 기반 헤어스타일 추천"/>
           <p:cNvSpPr txBox="1"/>
           <p:nvPr/>
         </p:nvSpPr>
@@ -12402,7 +12244,7 @@
       </p:sp>
       <p:sp>
         <p:nvSpPr>
-          <p:cNvPr id="112" name="선"/>
+          <p:cNvPr id="110" name="선"/>
           <p:cNvSpPr/>
           <p:nvPr/>
         </p:nvSpPr>
@@ -12437,7 +12279,7 @@
       </p:sp>
       <p:pic>
         <p:nvPicPr>
-          <p:cNvPr id="113" name="이미지" descr="이미지"/>
+          <p:cNvPr id="111" name="이미지" descr="이미지"/>
           <p:cNvPicPr>
             <a:picLocks noChangeAspect="1"/>
           </p:cNvPicPr>
@@ -12466,7 +12308,7 @@
       </p:pic>
       <p:sp>
         <p:nvSpPr>
-          <p:cNvPr id="114" name="다양한 헤어스타일에 대한 욕구와 시도"/>
+          <p:cNvPr id="112" name="다양한 헤어스타일에 대한 욕구와 시도"/>
           <p:cNvSpPr txBox="1"/>
           <p:nvPr/>
         </p:nvSpPr>
@@ -12517,7 +12359,7 @@
       </p:sp>
       <p:pic>
         <p:nvPicPr>
-          <p:cNvPr id="115" name="이미지" descr="이미지"/>
+          <p:cNvPr id="113" name="이미지" descr="이미지"/>
           <p:cNvPicPr>
             <a:picLocks noChangeAspect="1"/>
           </p:cNvPicPr>
@@ -12546,7 +12388,7 @@
       </p:pic>
       <p:sp>
         <p:nvSpPr>
-          <p:cNvPr id="116" name="자신의 얼굴형에 대한 무지"/>
+          <p:cNvPr id="114" name="자신의 얼굴형에 대한 무지"/>
           <p:cNvSpPr txBox="1"/>
           <p:nvPr/>
         </p:nvSpPr>
@@ -12597,7 +12439,7 @@
       </p:sp>
       <p:grpSp>
         <p:nvGrpSpPr>
-          <p:cNvPr id="121" name="그룹"/>
+          <p:cNvPr id="119" name="그룹"/>
           <p:cNvGrpSpPr/>
           <p:nvPr/>
         </p:nvGrpSpPr>
@@ -12611,7 +12453,7 @@
         </p:grpSpPr>
         <p:sp>
           <p:nvSpPr>
-            <p:cNvPr id="117" name="선"/>
+            <p:cNvPr id="115" name="선"/>
             <p:cNvSpPr/>
             <p:nvPr/>
           </p:nvSpPr>
@@ -12651,7 +12493,7 @@
         </p:sp>
         <p:sp>
           <p:nvSpPr>
-            <p:cNvPr id="118" name="선"/>
+            <p:cNvPr id="116" name="선"/>
             <p:cNvSpPr/>
             <p:nvPr/>
           </p:nvSpPr>
@@ -12691,7 +12533,7 @@
         </p:sp>
         <p:sp>
           <p:nvSpPr>
-            <p:cNvPr id="119" name="선"/>
+            <p:cNvPr id="117" name="선"/>
             <p:cNvSpPr/>
             <p:nvPr/>
           </p:nvSpPr>
@@ -12731,7 +12573,7 @@
         </p:sp>
         <p:sp>
           <p:nvSpPr>
-            <p:cNvPr id="120" name="선"/>
+            <p:cNvPr id="118" name="선"/>
             <p:cNvSpPr/>
             <p:nvPr/>
           </p:nvSpPr>
@@ -12772,7 +12614,7 @@
       </p:grpSp>
       <p:pic>
         <p:nvPicPr>
-          <p:cNvPr id="122" name="이미지" descr="이미지"/>
+          <p:cNvPr id="120" name="이미지" descr="이미지"/>
           <p:cNvPicPr>
             <a:picLocks noChangeAspect="1"/>
           </p:cNvPicPr>
@@ -12827,7 +12669,7 @@
       </p:grpSpPr>
       <p:sp>
         <p:nvSpPr>
-          <p:cNvPr id="124" name="슬라이드 번호"/>
+          <p:cNvPr id="122" name="슬라이드 번호"/>
           <p:cNvSpPr txBox="1"/>
           <p:nvPr>
             <p:ph type="sldNum" sz="quarter" idx="4294967295"/>
@@ -12858,7 +12700,7 @@
       </p:sp>
       <p:sp>
         <p:nvSpPr>
-          <p:cNvPr id="125" name="시스템 구조도"/>
+          <p:cNvPr id="123" name="시스템 구조도"/>
           <p:cNvSpPr txBox="1"/>
           <p:nvPr>
             <p:ph type="title"/>
@@ -12886,7 +12728,7 @@
       </p:sp>
       <p:grpSp>
         <p:nvGrpSpPr>
-          <p:cNvPr id="130" name="그룹 3"/>
+          <p:cNvPr id="128" name="그룹 3"/>
           <p:cNvGrpSpPr/>
           <p:nvPr/>
         </p:nvGrpSpPr>
@@ -12900,7 +12742,7 @@
         </p:grpSpPr>
         <p:pic>
           <p:nvPicPr>
-            <p:cNvPr id="126" name="이미지" descr="이미지"/>
+            <p:cNvPr id="124" name="이미지" descr="이미지"/>
             <p:cNvPicPr>
               <a:picLocks noChangeAspect="1"/>
             </p:cNvPicPr>
@@ -12931,7 +12773,7 @@
         </p:pic>
         <p:pic>
           <p:nvPicPr>
-            <p:cNvPr id="127" name="이미지" descr="이미지"/>
+            <p:cNvPr id="125" name="이미지" descr="이미지"/>
             <p:cNvPicPr>
               <a:picLocks noChangeAspect="1"/>
             </p:cNvPicPr>
@@ -12962,7 +12804,7 @@
         </p:pic>
         <p:pic>
           <p:nvPicPr>
-            <p:cNvPr id="128" name="이미지" descr="이미지"/>
+            <p:cNvPr id="126" name="이미지" descr="이미지"/>
             <p:cNvPicPr>
               <a:picLocks noChangeAspect="1"/>
             </p:cNvPicPr>
@@ -12993,7 +12835,7 @@
         </p:pic>
         <p:sp>
           <p:nvSpPr>
-            <p:cNvPr id="129" name="Web"/>
+            <p:cNvPr id="127" name="Web"/>
             <p:cNvSpPr txBox="1"/>
             <p:nvPr/>
           </p:nvSpPr>
@@ -13048,7 +12890,7 @@
       </p:grpSp>
       <p:grpSp>
         <p:nvGrpSpPr>
-          <p:cNvPr id="135" name="그룹 1"/>
+          <p:cNvPr id="133" name="그룹 1"/>
           <p:cNvGrpSpPr/>
           <p:nvPr/>
         </p:nvGrpSpPr>
@@ -13062,7 +12904,7 @@
         </p:grpSpPr>
         <p:pic>
           <p:nvPicPr>
-            <p:cNvPr id="131" name="이미지" descr="이미지"/>
+            <p:cNvPr id="129" name="이미지" descr="이미지"/>
             <p:cNvPicPr>
               <a:picLocks noChangeAspect="1"/>
             </p:cNvPicPr>
@@ -13093,7 +12935,7 @@
         </p:pic>
         <p:pic>
           <p:nvPicPr>
-            <p:cNvPr id="132" name="이미지" descr="이미지"/>
+            <p:cNvPr id="130" name="이미지" descr="이미지"/>
             <p:cNvPicPr>
               <a:picLocks noChangeAspect="1"/>
             </p:cNvPicPr>
@@ -13124,7 +12966,7 @@
         </p:pic>
         <p:pic>
           <p:nvPicPr>
-            <p:cNvPr id="133" name="이미지" descr="이미지"/>
+            <p:cNvPr id="131" name="이미지" descr="이미지"/>
             <p:cNvPicPr>
               <a:picLocks noChangeAspect="1"/>
             </p:cNvPicPr>
@@ -13155,7 +12997,7 @@
         </p:pic>
         <p:sp>
           <p:nvSpPr>
-            <p:cNvPr id="134" name="Server"/>
+            <p:cNvPr id="132" name="Server"/>
             <p:cNvSpPr txBox="1"/>
             <p:nvPr/>
           </p:nvSpPr>
@@ -13210,7 +13052,7 @@
       </p:grpSp>
       <p:grpSp>
         <p:nvGrpSpPr>
-          <p:cNvPr id="140" name="그룹 4"/>
+          <p:cNvPr id="138" name="그룹 4"/>
           <p:cNvGrpSpPr/>
           <p:nvPr/>
         </p:nvGrpSpPr>
@@ -13224,7 +13066,7 @@
         </p:grpSpPr>
         <p:pic>
           <p:nvPicPr>
-            <p:cNvPr id="136" name="이미지" descr="이미지"/>
+            <p:cNvPr id="134" name="이미지" descr="이미지"/>
             <p:cNvPicPr>
               <a:picLocks noChangeAspect="1"/>
             </p:cNvPicPr>
@@ -13255,7 +13097,7 @@
         </p:pic>
         <p:pic>
           <p:nvPicPr>
-            <p:cNvPr id="137" name="이미지" descr="이미지"/>
+            <p:cNvPr id="135" name="이미지" descr="이미지"/>
             <p:cNvPicPr>
               <a:picLocks noChangeAspect="1"/>
             </p:cNvPicPr>
@@ -13286,7 +13128,7 @@
         </p:pic>
         <p:sp>
           <p:nvSpPr>
-            <p:cNvPr id="138" name="User"/>
+            <p:cNvPr id="136" name="User"/>
             <p:cNvSpPr txBox="1"/>
             <p:nvPr/>
           </p:nvSpPr>
@@ -13340,7 +13182,7 @@
         </p:sp>
         <p:sp>
           <p:nvSpPr>
-            <p:cNvPr id="139" name="Webcam…"/>
+            <p:cNvPr id="137" name="Webcam…"/>
             <p:cNvSpPr txBox="1"/>
             <p:nvPr/>
           </p:nvSpPr>
@@ -13412,7 +13254,7 @@
       </p:grpSp>
       <p:grpSp>
         <p:nvGrpSpPr>
-          <p:cNvPr id="146" name="그룹 2"/>
+          <p:cNvPr id="144" name="그룹 2"/>
           <p:cNvGrpSpPr/>
           <p:nvPr/>
         </p:nvGrpSpPr>
@@ -13426,7 +13268,7 @@
         </p:grpSpPr>
         <p:pic>
           <p:nvPicPr>
-            <p:cNvPr id="141" name="이미지" descr="이미지"/>
+            <p:cNvPr id="139" name="이미지" descr="이미지"/>
             <p:cNvPicPr>
               <a:picLocks noChangeAspect="1"/>
             </p:cNvPicPr>
@@ -13457,7 +13299,7 @@
         </p:pic>
         <p:sp>
           <p:nvSpPr>
-            <p:cNvPr id="142" name="Model"/>
+            <p:cNvPr id="140" name="Model"/>
             <p:cNvSpPr txBox="1"/>
             <p:nvPr/>
           </p:nvSpPr>
@@ -13511,7 +13353,7 @@
         </p:sp>
         <p:pic>
           <p:nvPicPr>
-            <p:cNvPr id="143" name="이미지" descr="이미지"/>
+            <p:cNvPr id="141" name="이미지" descr="이미지"/>
             <p:cNvPicPr>
               <a:picLocks noChangeAspect="1"/>
             </p:cNvPicPr>
@@ -13542,7 +13384,7 @@
         </p:pic>
         <p:pic>
           <p:nvPicPr>
-            <p:cNvPr id="144" name="이미지" descr="이미지"/>
+            <p:cNvPr id="142" name="이미지" descr="이미지"/>
             <p:cNvPicPr>
               <a:picLocks noChangeAspect="1"/>
             </p:cNvPicPr>
@@ -13573,7 +13415,7 @@
         </p:pic>
         <p:pic>
           <p:nvPicPr>
-            <p:cNvPr id="145" name="이미지" descr="이미지"/>
+            <p:cNvPr id="143" name="이미지" descr="이미지"/>
             <p:cNvPicPr>
               <a:picLocks noChangeAspect="1"/>
             </p:cNvPicPr>
@@ -13605,7 +13447,7 @@
       </p:grpSp>
       <p:sp>
         <p:nvSpPr>
-          <p:cNvPr id="147" name="선"/>
+          <p:cNvPr id="145" name="선"/>
           <p:cNvSpPr/>
           <p:nvPr/>
         </p:nvSpPr>
@@ -13641,7 +13483,7 @@
       </p:sp>
       <p:sp>
         <p:nvSpPr>
-          <p:cNvPr id="148" name="선"/>
+          <p:cNvPr id="146" name="선"/>
           <p:cNvSpPr/>
           <p:nvPr/>
         </p:nvSpPr>
@@ -13677,7 +13519,7 @@
       </p:sp>
       <p:sp>
         <p:nvSpPr>
-          <p:cNvPr id="149" name="선"/>
+          <p:cNvPr id="147" name="선"/>
           <p:cNvSpPr/>
           <p:nvPr/>
         </p:nvSpPr>
@@ -13713,7 +13555,7 @@
       </p:sp>
       <p:sp>
         <p:nvSpPr>
-          <p:cNvPr id="150" name="선"/>
+          <p:cNvPr id="148" name="선"/>
           <p:cNvSpPr/>
           <p:nvPr/>
         </p:nvSpPr>
@@ -13749,7 +13591,7 @@
       </p:sp>
       <p:sp>
         <p:nvSpPr>
-          <p:cNvPr id="151" name="선"/>
+          <p:cNvPr id="149" name="선"/>
           <p:cNvSpPr/>
           <p:nvPr/>
         </p:nvSpPr>
@@ -13785,7 +13627,7 @@
       </p:sp>
       <p:sp>
         <p:nvSpPr>
-          <p:cNvPr id="152" name="선"/>
+          <p:cNvPr id="150" name="선"/>
           <p:cNvSpPr/>
           <p:nvPr/>
         </p:nvSpPr>
@@ -13846,7 +13688,7 @@
       </p:grpSpPr>
       <p:sp>
         <p:nvSpPr>
-          <p:cNvPr id="154" name="주요 기능 - 모델 변경 사항"/>
+          <p:cNvPr id="152" name="주요 기능 - 모델 변경 사항"/>
           <p:cNvSpPr txBox="1"/>
           <p:nvPr>
             <p:ph type="title"/>
@@ -13883,7 +13725,7 @@
       </p:sp>
       <p:sp>
         <p:nvSpPr>
-          <p:cNvPr id="155" name="선"/>
+          <p:cNvPr id="153" name="선"/>
           <p:cNvSpPr/>
           <p:nvPr/>
         </p:nvSpPr>
@@ -13918,7 +13760,7 @@
       </p:sp>
       <p:pic>
         <p:nvPicPr>
-          <p:cNvPr id="156" name="그림 21" descr="그림 21"/>
+          <p:cNvPr id="154" name="그림 21" descr="그림 21"/>
           <p:cNvPicPr>
             <a:picLocks noChangeAspect="1"/>
           </p:cNvPicPr>
@@ -13947,7 +13789,7 @@
       </p:pic>
       <p:sp>
         <p:nvSpPr>
-          <p:cNvPr id="157" name="Data Augmentation"/>
+          <p:cNvPr id="155" name="Data Augmentation"/>
           <p:cNvSpPr txBox="1"/>
           <p:nvPr/>
         </p:nvSpPr>
@@ -14016,7 +13858,7 @@
       </p:sp>
       <p:pic>
         <p:nvPicPr>
-          <p:cNvPr id="158" name="그림 23" descr="그림 23"/>
+          <p:cNvPr id="156" name="그림 23" descr="그림 23"/>
           <p:cNvPicPr>
             <a:picLocks noChangeAspect="1"/>
           </p:cNvPicPr>
@@ -14045,7 +13887,7 @@
       </p:pic>
       <p:grpSp>
         <p:nvGrpSpPr>
-          <p:cNvPr id="161" name="1"/>
+          <p:cNvPr id="159" name="1"/>
           <p:cNvGrpSpPr/>
           <p:nvPr/>
         </p:nvGrpSpPr>
@@ -14059,7 +13901,7 @@
         </p:grpSpPr>
         <p:sp>
           <p:nvSpPr>
-            <p:cNvPr id="159" name="도형"/>
+            <p:cNvPr id="157" name="도형"/>
             <p:cNvSpPr/>
             <p:nvPr/>
           </p:nvSpPr>
@@ -14151,7 +13993,7 @@
         </p:sp>
         <p:sp>
           <p:nvSpPr>
-            <p:cNvPr id="160" name="Hosting"/>
+            <p:cNvPr id="158" name="Hosting"/>
             <p:cNvSpPr txBox="1"/>
             <p:nvPr/>
           </p:nvSpPr>
@@ -14206,7 +14048,7 @@
       </p:grpSp>
       <p:pic>
         <p:nvPicPr>
-          <p:cNvPr id="162" name="그림 25" descr="그림 25"/>
+          <p:cNvPr id="160" name="그림 25" descr="그림 25"/>
           <p:cNvPicPr>
             <a:picLocks noChangeAspect="1"/>
           </p:cNvPicPr>
@@ -14261,7 +14103,7 @@
       </p:grpSpPr>
       <p:sp>
         <p:nvSpPr>
-          <p:cNvPr id="164" name="슬라이드 번호"/>
+          <p:cNvPr id="162" name="슬라이드 번호"/>
           <p:cNvSpPr txBox="1"/>
           <p:nvPr>
             <p:ph type="sldNum" sz="quarter" idx="4294967295"/>
@@ -14292,7 +14134,7 @@
       </p:sp>
       <p:sp>
         <p:nvSpPr>
-          <p:cNvPr id="165" name="시스템 구조도"/>
+          <p:cNvPr id="163" name="시스템 구조도"/>
           <p:cNvSpPr txBox="1"/>
           <p:nvPr>
             <p:ph type="title"/>
@@ -14328,7 +14170,7 @@
       </p:sp>
       <p:sp>
         <p:nvSpPr>
-          <p:cNvPr id="166" name="선"/>
+          <p:cNvPr id="164" name="선"/>
           <p:cNvSpPr/>
           <p:nvPr/>
         </p:nvSpPr>
@@ -14363,7 +14205,7 @@
       </p:sp>
       <p:sp>
         <p:nvSpPr>
-          <p:cNvPr id="167" name="도형"/>
+          <p:cNvPr id="165" name="도형"/>
           <p:cNvSpPr/>
           <p:nvPr/>
         </p:nvSpPr>
@@ -14450,7 +14292,7 @@
       </p:sp>
       <p:sp>
         <p:nvSpPr>
-          <p:cNvPr id="168" name="얼굴형 판단 정확성 향상"/>
+          <p:cNvPr id="166" name="얼굴형 판단 정확성 향상"/>
           <p:cNvSpPr/>
           <p:nvPr/>
         </p:nvSpPr>
@@ -14507,7 +14349,7 @@
       </p:sp>
       <p:sp>
         <p:nvSpPr>
-          <p:cNvPr id="169" name="개발 계획 구체화"/>
+          <p:cNvPr id="167" name="개발 계획 구체화"/>
           <p:cNvSpPr txBox="1"/>
           <p:nvPr/>
         </p:nvSpPr>
@@ -14558,13 +14400,58 @@
       </p:sp>
       <p:sp>
         <p:nvSpPr>
-          <p:cNvPr id="170" name="높은 수준의  판단력"/>
+          <p:cNvPr id="168" name="원"/>
           <p:cNvSpPr/>
           <p:nvPr/>
         </p:nvSpPr>
         <p:spPr>
           <a:xfrm>
             <a:off x="6003924" y="6192125"/>
+            <a:ext cx="3175001" cy="3175001"/>
+          </a:xfrm>
+          <a:prstGeom prst="ellipse">
+            <a:avLst/>
+          </a:prstGeom>
+          <a:solidFill>
+            <a:srgbClr val="FFFFFF"/>
+          </a:solidFill>
+          <a:ln w="25400">
+            <a:solidFill>
+              <a:srgbClr val="818779"/>
+            </a:solidFill>
+            <a:miter lim="400000"/>
+          </a:ln>
+        </p:spPr>
+        <p:txBody>
+          <a:bodyPr lIns="82987" tIns="82987" rIns="82987" bIns="82987" anchor="ctr"/>
+          <a:lstStyle/>
+          <a:p>
+            <a:pPr algn="ctr" defTabSz="825500">
+              <a:lnSpc>
+                <a:spcPct val="100000"/>
+              </a:lnSpc>
+              <a:defRPr b="1" sz="3000">
+                <a:solidFill>
+                  <a:srgbClr val="232323"/>
+                </a:solidFill>
+                <a:latin typeface="+mn-lt"/>
+                <a:ea typeface="+mn-ea"/>
+                <a:cs typeface="+mn-cs"/>
+                <a:sym typeface="Helvetica"/>
+              </a:defRPr>
+            </a:pPr>
+          </a:p>
+        </p:txBody>
+      </p:sp>
+      <p:sp>
+        <p:nvSpPr>
+          <p:cNvPr id="169" name="머신 러닝 모델  개발 계획"/>
+          <p:cNvSpPr/>
+          <p:nvPr/>
+        </p:nvSpPr>
+        <p:spPr>
+          <a:xfrm>
+            <a:off x="10553331" y="4801891"/>
             <a:ext cx="3175001" cy="3175001"/>
           </a:xfrm>
           <a:prstGeom prst="ellipse">
@@ -14604,24 +14491,24 @@
               </a:defRPr>
             </a:pPr>
             <a:r>
-              <a:t>높은 수준의 </a:t>
+              <a:t>머신 러닝 모델 </a:t>
             </a:r>
             <a:br/>
             <a:r>
-              <a:t>판단력</a:t>
+              <a:t>개발 계획</a:t>
             </a:r>
           </a:p>
         </p:txBody>
       </p:sp>
       <p:sp>
         <p:nvSpPr>
-          <p:cNvPr id="171" name="머신 러닝 모델  개발 계획"/>
+          <p:cNvPr id="170" name="원"/>
           <p:cNvSpPr/>
           <p:nvPr/>
         </p:nvSpPr>
         <p:spPr>
           <a:xfrm>
-            <a:off x="10553331" y="4801891"/>
+            <a:off x="17458028" y="9836034"/>
             <a:ext cx="3175001" cy="3175001"/>
           </a:xfrm>
           <a:prstGeom prst="ellipse">
@@ -14636,11 +14523,6 @@
             </a:solidFill>
             <a:miter lim="400000"/>
           </a:ln>
-          <a:extLst>
-            <a:ext uri="{C572A759-6A51-4108-AA02-DFA0A04FC94B}">
-              <ma14:wrappingTextBoxFlag xmlns:ma14="http://schemas.microsoft.com/office/mac/drawingml/2011/main" val="1"/>
-            </a:ext>
-          </a:extLst>
         </p:spPr>
         <p:txBody>
           <a:bodyPr lIns="82987" tIns="82987" rIns="82987" bIns="82987" anchor="ctr"/>
@@ -14660,76 +14542,12 @@
                 <a:sym typeface="Helvetica"/>
               </a:defRPr>
             </a:pPr>
-            <a:r>
-              <a:t>머신 러닝 모델 </a:t>
-            </a:r>
-            <a:br/>
-            <a:r>
-              <a:t>개발 계획</a:t>
-            </a:r>
           </a:p>
         </p:txBody>
       </p:sp>
       <p:sp>
         <p:nvSpPr>
-          <p:cNvPr id="172" name="얼굴형 판단 정확성 향상"/>
-          <p:cNvSpPr/>
-          <p:nvPr/>
-        </p:nvSpPr>
-        <p:spPr>
-          <a:xfrm>
-            <a:off x="17458028" y="9836034"/>
-            <a:ext cx="3175001" cy="3175001"/>
-          </a:xfrm>
-          <a:prstGeom prst="ellipse">
-            <a:avLst/>
-          </a:prstGeom>
-          <a:solidFill>
-            <a:srgbClr val="FFFFFF"/>
-          </a:solidFill>
-          <a:ln w="25400">
-            <a:solidFill>
-              <a:srgbClr val="818779"/>
-            </a:solidFill>
-            <a:miter lim="400000"/>
-          </a:ln>
-          <a:extLst>
-            <a:ext uri="{C572A759-6A51-4108-AA02-DFA0A04FC94B}">
-              <ma14:wrappingTextBoxFlag xmlns:ma14="http://schemas.microsoft.com/office/mac/drawingml/2011/main" val="1"/>
-            </a:ext>
-          </a:extLst>
-        </p:spPr>
-        <p:txBody>
-          <a:bodyPr lIns="82987" tIns="82987" rIns="82987" bIns="82987" anchor="ctr"/>
-          <a:lstStyle/>
-          <a:p>
-            <a:pPr algn="ctr" defTabSz="825500">
-              <a:lnSpc>
-                <a:spcPct val="100000"/>
-              </a:lnSpc>
-              <a:defRPr b="1" sz="3000">
-                <a:solidFill>
-                  <a:srgbClr val="232323"/>
-                </a:solidFill>
-                <a:latin typeface="+mn-lt"/>
-                <a:ea typeface="+mn-ea"/>
-                <a:cs typeface="+mn-cs"/>
-                <a:sym typeface="Helvetica"/>
-              </a:defRPr>
-            </a:pPr>
-            <a:r>
-              <a:t>얼굴형 판단</a:t>
-            </a:r>
-            <a:br/>
-            <a:r>
-              <a:t>정확성 향상 </a:t>
-            </a:r>
-          </a:p>
-        </p:txBody>
-      </p:sp>
-      <p:sp>
-        <p:nvSpPr>
-          <p:cNvPr id="173" name="지도 학습"/>
+          <p:cNvPr id="171" name="지도 학습"/>
           <p:cNvSpPr/>
           <p:nvPr/>
         </p:nvSpPr>
@@ -14810,7 +14628,7 @@
       </p:grpSpPr>
       <p:pic>
         <p:nvPicPr>
-          <p:cNvPr id="175" name="이미지" descr="이미지"/>
+          <p:cNvPr id="173" name="이미지" descr="이미지"/>
           <p:cNvPicPr>
             <a:picLocks noChangeAspect="1"/>
           </p:cNvPicPr>
@@ -14839,7 +14657,7 @@
       </p:pic>
       <p:sp>
         <p:nvSpPr>
-          <p:cNvPr id="176" name="슬라이드 번호"/>
+          <p:cNvPr id="174" name="슬라이드 번호"/>
           <p:cNvSpPr txBox="1"/>
           <p:nvPr>
             <p:ph type="sldNum" sz="quarter" idx="4294967295"/>
@@ -14870,7 +14688,7 @@
       </p:sp>
       <p:sp>
         <p:nvSpPr>
-          <p:cNvPr id="177" name="주요 기능 - 모델 변경 사항"/>
+          <p:cNvPr id="175" name="주요 기능 - 모델 변경 사항"/>
           <p:cNvSpPr txBox="1"/>
           <p:nvPr>
             <p:ph type="title"/>
@@ -14898,7 +14716,7 @@
       </p:sp>
       <p:sp>
         <p:nvSpPr>
-          <p:cNvPr id="178" name="선"/>
+          <p:cNvPr id="176" name="선"/>
           <p:cNvSpPr/>
           <p:nvPr/>
         </p:nvSpPr>
@@ -14933,7 +14751,7 @@
       </p:sp>
       <p:sp>
         <p:nvSpPr>
-          <p:cNvPr id="179" name="기존 모델 Tensorflow.js의 Face-Landmark-Detection"/>
+          <p:cNvPr id="177" name="기존 모델 Tensorflow.js의 Face-Landmark-Detection"/>
           <p:cNvSpPr txBox="1"/>
           <p:nvPr/>
         </p:nvSpPr>
@@ -14994,7 +14812,7 @@
       </p:sp>
       <p:sp>
         <p:nvSpPr>
-          <p:cNvPr id="180" name="특징점을 추출하여 얻은 숫자 데이터를 토대로 가볍고 높은 성능의 모델 기대"/>
+          <p:cNvPr id="178" name="특징점을 추출하여 얻은 숫자 데이터를 토대로 가볍고 높은 성능의 모델 기대"/>
           <p:cNvSpPr txBox="1"/>
           <p:nvPr/>
         </p:nvSpPr>

</xml_diff>

<commit_message>
수정/docs : ppt 18p 추가
</commit_message>
<xml_diff>
--- a/docs/Capstone-team14-presentation.pptx
+++ b/docs/Capstone-team14-presentation.pptx
@@ -27,6 +27,7 @@
     <p:sldId id="272" r:id="rId24"/>
     <p:sldId id="273" r:id="rId25"/>
     <p:sldId id="274" r:id="rId26"/>
+    <p:sldId id="275" r:id="rId27"/>
   </p:sldIdLst>
   <p:sldSz cx="24384000" cy="13716000"/>
   <p:notesSz cx="6858000" cy="9144000"/>
@@ -7859,7 +7860,7 @@
       </p:sp>
       <p:sp>
         <p:nvSpPr>
-          <p:cNvPr id="300" name="멘토링 - Modeling"/>
+          <p:cNvPr id="300" name="주요 기능 - VGGNet &amp; Mobile Net V2"/>
           <p:cNvSpPr txBox="1"/>
           <p:nvPr>
             <p:ph type="title"/>
@@ -7880,10 +7881,13 @@
           <a:p>
             <a:pPr/>
             <a:r>
-              <a:t>멘토</a:t>
-            </a:r>
-            <a:r>
-              <a:t>링</a:t>
+              <a:t>주요 기능 </a:t>
+            </a:r>
+            <a:r>
+              <a:t>– </a:t>
+            </a:r>
+            <a:r>
+              <a:t>모델 배포</a:t>
             </a:r>
           </a:p>
         </p:txBody>
@@ -7897,7 +7901,7 @@
         <p:spPr>
           <a:xfrm flipV="1">
             <a:off x="853156" y="2606184"/>
-            <a:ext cx="23315050" cy="2"/>
+            <a:ext cx="22677688" cy="2"/>
           </a:xfrm>
           <a:prstGeom prst="line">
             <a:avLst/>
@@ -7923,16 +7927,416 @@
           </a:p>
         </p:txBody>
       </p:sp>
+      <p:grpSp>
+        <p:nvGrpSpPr>
+          <p:cNvPr id="305" name="그룹 13"/>
+          <p:cNvGrpSpPr/>
+          <p:nvPr/>
+        </p:nvGrpSpPr>
+        <p:grpSpPr>
+          <a:xfrm>
+            <a:off x="715412" y="5918065"/>
+            <a:ext cx="5531542" cy="3860561"/>
+            <a:chOff x="0" y="0"/>
+            <a:chExt cx="5531541" cy="3860560"/>
+          </a:xfrm>
+        </p:grpSpPr>
+        <p:pic>
+          <p:nvPicPr>
+            <p:cNvPr id="302" name="이미지" descr="이미지"/>
+            <p:cNvPicPr>
+              <a:picLocks noChangeAspect="1"/>
+            </p:cNvPicPr>
+            <p:nvPr/>
+          </p:nvPicPr>
+          <p:blipFill>
+            <a:blip r:embed="rId2">
+              <a:extLst/>
+            </a:blip>
+            <a:stretch>
+              <a:fillRect/>
+            </a:stretch>
+          </p:blipFill>
+          <p:spPr>
+            <a:xfrm>
+              <a:off x="731479" y="0"/>
+              <a:ext cx="3233480" cy="937710"/>
+            </a:xfrm>
+            <a:prstGeom prst="rect">
+              <a:avLst/>
+            </a:prstGeom>
+            <a:ln w="12700" cap="flat">
+              <a:noFill/>
+              <a:miter lim="400000"/>
+            </a:ln>
+            <a:effectLst/>
+          </p:spPr>
+        </p:pic>
+        <p:pic>
+          <p:nvPicPr>
+            <p:cNvPr id="303" name="이미지" descr="이미지"/>
+            <p:cNvPicPr>
+              <a:picLocks noChangeAspect="1"/>
+            </p:cNvPicPr>
+            <p:nvPr/>
+          </p:nvPicPr>
+          <p:blipFill>
+            <a:blip r:embed="rId3">
+              <a:extLst/>
+            </a:blip>
+            <a:stretch>
+              <a:fillRect/>
+            </a:stretch>
+          </p:blipFill>
+          <p:spPr>
+            <a:xfrm>
+              <a:off x="0" y="1340674"/>
+              <a:ext cx="5531542" cy="1856404"/>
+            </a:xfrm>
+            <a:prstGeom prst="rect">
+              <a:avLst/>
+            </a:prstGeom>
+            <a:ln w="12700" cap="flat">
+              <a:noFill/>
+              <a:miter lim="400000"/>
+            </a:ln>
+            <a:effectLst/>
+          </p:spPr>
+        </p:pic>
+        <p:sp>
+          <p:nvSpPr>
+            <p:cNvPr id="304" name="TextBox 12"/>
+            <p:cNvSpPr txBox="1"/>
+            <p:nvPr/>
+          </p:nvSpPr>
+          <p:spPr>
+            <a:xfrm>
+              <a:off x="872011" y="3276360"/>
+              <a:ext cx="3371089" cy="584201"/>
+            </a:xfrm>
+            <a:prstGeom prst="rect">
+              <a:avLst/>
+            </a:prstGeom>
+            <a:noFill/>
+            <a:ln w="12700" cap="flat">
+              <a:noFill/>
+              <a:miter lim="400000"/>
+            </a:ln>
+            <a:effectLst/>
+            <a:extLst>
+              <a:ext uri="{C572A759-6A51-4108-AA02-DFA0A04FC94B}">
+                <ma14:wrappingTextBoxFlag xmlns:ma14="http://schemas.microsoft.com/office/mac/drawingml/2011/main" val="1"/>
+              </a:ext>
+            </a:extLst>
+          </p:spPr>
+          <p:txBody>
+            <a:bodyPr wrap="square" lIns="50800" tIns="50800" rIns="50800" bIns="50800" numCol="1" anchor="ctr">
+              <a:spAutoFit/>
+            </a:bodyPr>
+            <a:lstStyle>
+              <a:lvl1pPr algn="ctr">
+                <a:defRPr b="1" sz="3200">
+                  <a:solidFill>
+                    <a:srgbClr val="232323"/>
+                  </a:solidFill>
+                  <a:latin typeface="+mn-lt"/>
+                  <a:ea typeface="+mn-ea"/>
+                  <a:cs typeface="+mn-cs"/>
+                  <a:sym typeface="Helvetica"/>
+                </a:defRPr>
+              </a:lvl1pPr>
+            </a:lstStyle>
+            <a:p>
+              <a:pPr/>
+              <a:r>
+                <a:t>Model</a:t>
+              </a:r>
+            </a:p>
+          </p:txBody>
+        </p:sp>
+      </p:grpSp>
+      <p:sp>
+        <p:nvSpPr>
+          <p:cNvPr id="306" name="선"/>
+          <p:cNvSpPr/>
+          <p:nvPr/>
+        </p:nvSpPr>
+        <p:spPr>
+          <a:xfrm>
+            <a:off x="5649741" y="7277824"/>
+            <a:ext cx="2586454" cy="3"/>
+          </a:xfrm>
+          <a:prstGeom prst="line">
+            <a:avLst/>
+          </a:prstGeom>
+          <a:ln w="101600">
+            <a:solidFill>
+              <a:srgbClr val="818779"/>
+            </a:solidFill>
+            <a:miter lim="400000"/>
+            <a:tailEnd type="triangle"/>
+          </a:ln>
+        </p:spPr>
+        <p:txBody>
+          <a:bodyPr lIns="45718" tIns="45718" rIns="45718" bIns="45718"/>
+          <a:lstStyle/>
+          <a:p>
+            <a:pPr>
+              <a:defRPr>
+                <a:solidFill>
+                  <a:srgbClr val="818779"/>
+                </a:solidFill>
+              </a:defRPr>
+            </a:pPr>
+          </a:p>
+        </p:txBody>
+      </p:sp>
+      <p:sp>
+        <p:nvSpPr>
+          <p:cNvPr id="307" name="선"/>
+          <p:cNvSpPr/>
+          <p:nvPr/>
+        </p:nvSpPr>
+        <p:spPr>
+          <a:xfrm>
+            <a:off x="11785434" y="7277826"/>
+            <a:ext cx="2361959" cy="1"/>
+          </a:xfrm>
+          <a:prstGeom prst="line">
+            <a:avLst/>
+          </a:prstGeom>
+          <a:ln w="101600">
+            <a:solidFill>
+              <a:srgbClr val="818779"/>
+            </a:solidFill>
+            <a:miter lim="400000"/>
+            <a:tailEnd type="triangle"/>
+          </a:ln>
+        </p:spPr>
+        <p:txBody>
+          <a:bodyPr lIns="45718" tIns="45718" rIns="45718" bIns="45718"/>
+          <a:lstStyle/>
+          <a:p>
+            <a:pPr>
+              <a:defRPr>
+                <a:solidFill>
+                  <a:srgbClr val="818779"/>
+                </a:solidFill>
+              </a:defRPr>
+            </a:pPr>
+          </a:p>
+        </p:txBody>
+      </p:sp>
+      <p:grpSp>
+        <p:nvGrpSpPr>
+          <p:cNvPr id="310" name="그룹 16"/>
+          <p:cNvGrpSpPr/>
+          <p:nvPr/>
+        </p:nvGrpSpPr>
+        <p:grpSpPr>
+          <a:xfrm>
+            <a:off x="8972339" y="5989527"/>
+            <a:ext cx="2669286" cy="3808186"/>
+            <a:chOff x="0" y="0"/>
+            <a:chExt cx="2669285" cy="3808185"/>
+          </a:xfrm>
+        </p:grpSpPr>
+        <p:pic>
+          <p:nvPicPr>
+            <p:cNvPr id="308" name="그림 3" descr="그림 3"/>
+            <p:cNvPicPr>
+              <a:picLocks noChangeAspect="1"/>
+            </p:cNvPicPr>
+            <p:nvPr/>
+          </p:nvPicPr>
+          <p:blipFill>
+            <a:blip r:embed="rId4">
+              <a:extLst/>
+            </a:blip>
+            <a:stretch>
+              <a:fillRect/>
+            </a:stretch>
+          </p:blipFill>
+          <p:spPr>
+            <a:xfrm>
+              <a:off x="128676" y="0"/>
+              <a:ext cx="2084071" cy="2579371"/>
+            </a:xfrm>
+            <a:prstGeom prst="rect">
+              <a:avLst/>
+            </a:prstGeom>
+            <a:ln w="12700" cap="flat">
+              <a:noFill/>
+              <a:miter lim="400000"/>
+            </a:ln>
+            <a:effectLst/>
+          </p:spPr>
+        </p:pic>
+        <p:sp>
+          <p:nvSpPr>
+            <p:cNvPr id="309" name="TextBox 14"/>
+            <p:cNvSpPr txBox="1"/>
+            <p:nvPr/>
+          </p:nvSpPr>
+          <p:spPr>
+            <a:xfrm>
+              <a:off x="0" y="3223985"/>
+              <a:ext cx="2669286" cy="584201"/>
+            </a:xfrm>
+            <a:prstGeom prst="rect">
+              <a:avLst/>
+            </a:prstGeom>
+            <a:noFill/>
+            <a:ln w="12700" cap="flat">
+              <a:noFill/>
+              <a:miter lim="400000"/>
+            </a:ln>
+            <a:effectLst/>
+            <a:extLst>
+              <a:ext uri="{C572A759-6A51-4108-AA02-DFA0A04FC94B}">
+                <ma14:wrappingTextBoxFlag xmlns:ma14="http://schemas.microsoft.com/office/mac/drawingml/2011/main" val="1"/>
+              </a:ext>
+            </a:extLst>
+          </p:spPr>
+          <p:txBody>
+            <a:bodyPr wrap="square" lIns="50800" tIns="50800" rIns="50800" bIns="50800" numCol="1" anchor="ctr">
+              <a:spAutoFit/>
+            </a:bodyPr>
+            <a:lstStyle>
+              <a:lvl1pPr algn="ctr">
+                <a:defRPr b="1" sz="3200">
+                  <a:solidFill>
+                    <a:srgbClr val="232323"/>
+                  </a:solidFill>
+                  <a:latin typeface="+mn-lt"/>
+                  <a:ea typeface="+mn-ea"/>
+                  <a:cs typeface="+mn-cs"/>
+                  <a:sym typeface="Helvetica"/>
+                </a:defRPr>
+              </a:lvl1pPr>
+            </a:lstStyle>
+            <a:p>
+              <a:pPr/>
+              <a:r>
+                <a:t>Model.json</a:t>
+              </a:r>
+            </a:p>
+          </p:txBody>
+        </p:sp>
+      </p:grpSp>
+      <p:grpSp>
+        <p:nvGrpSpPr>
+          <p:cNvPr id="313" name="그룹 20"/>
+          <p:cNvGrpSpPr/>
+          <p:nvPr/>
+        </p:nvGrpSpPr>
+        <p:grpSpPr>
+          <a:xfrm>
+            <a:off x="14367010" y="5884818"/>
+            <a:ext cx="8758648" cy="3927055"/>
+            <a:chOff x="0" y="0"/>
+            <a:chExt cx="8758646" cy="3927054"/>
+          </a:xfrm>
+        </p:grpSpPr>
+        <p:pic>
+          <p:nvPicPr>
+            <p:cNvPr id="311" name="그림 9" descr="그림 9"/>
+            <p:cNvPicPr>
+              <a:picLocks noChangeAspect="1"/>
+            </p:cNvPicPr>
+            <p:nvPr/>
+          </p:nvPicPr>
+          <p:blipFill>
+            <a:blip r:embed="rId5">
+              <a:extLst/>
+            </a:blip>
+            <a:stretch>
+              <a:fillRect/>
+            </a:stretch>
+          </p:blipFill>
+          <p:spPr>
+            <a:xfrm>
+              <a:off x="0" y="0"/>
+              <a:ext cx="8758647" cy="3240700"/>
+            </a:xfrm>
+            <a:prstGeom prst="rect">
+              <a:avLst/>
+            </a:prstGeom>
+            <a:ln w="12700" cap="flat">
+              <a:noFill/>
+              <a:miter lim="400000"/>
+            </a:ln>
+            <a:effectLst/>
+          </p:spPr>
+        </p:pic>
+        <p:sp>
+          <p:nvSpPr>
+            <p:cNvPr id="312" name="TextBox 15"/>
+            <p:cNvSpPr txBox="1"/>
+            <p:nvPr/>
+          </p:nvSpPr>
+          <p:spPr>
+            <a:xfrm>
+              <a:off x="630316" y="3457154"/>
+              <a:ext cx="7894602" cy="469901"/>
+            </a:xfrm>
+            <a:prstGeom prst="rect">
+              <a:avLst/>
+            </a:prstGeom>
+            <a:noFill/>
+            <a:ln w="12700" cap="flat">
+              <a:noFill/>
+              <a:miter lim="400000"/>
+            </a:ln>
+            <a:effectLst/>
+            <a:extLst>
+              <a:ext uri="{C572A759-6A51-4108-AA02-DFA0A04FC94B}">
+                <ma14:wrappingTextBoxFlag xmlns:ma14="http://schemas.microsoft.com/office/mac/drawingml/2011/main" val="1"/>
+              </a:ext>
+            </a:extLst>
+          </p:spPr>
+          <p:txBody>
+            <a:bodyPr wrap="square" lIns="50800" tIns="50800" rIns="50800" bIns="50800" numCol="1" anchor="ctr">
+              <a:spAutoFit/>
+            </a:bodyPr>
+            <a:lstStyle/>
+            <a:p>
+              <a:pPr algn="ctr">
+                <a:defRPr b="1" sz="2400">
+                  <a:solidFill>
+                    <a:srgbClr val="232323"/>
+                  </a:solidFill>
+                  <a:latin typeface="+mn-lt"/>
+                  <a:ea typeface="+mn-ea"/>
+                  <a:cs typeface="+mn-cs"/>
+                  <a:sym typeface="Helvetica"/>
+                </a:defRPr>
+              </a:pPr>
+              <a:r>
+                <a:t>https://USERNAME.github.io/</a:t>
+              </a:r>
+              <a:r>
+                <a:rPr>
+                  <a:solidFill>
+                    <a:srgbClr val="FF0000"/>
+                  </a:solidFill>
+                </a:rPr>
+                <a:t>Model.json</a:t>
+              </a:r>
+            </a:p>
+          </p:txBody>
+        </p:sp>
+      </p:grpSp>
       <p:pic>
         <p:nvPicPr>
-          <p:cNvPr id="302" name="이미지" descr="이미지"/>
+          <p:cNvPr id="314" name="이미지" descr="이미지"/>
           <p:cNvPicPr>
             <a:picLocks noChangeAspect="1"/>
           </p:cNvPicPr>
           <p:nvPr/>
         </p:nvPicPr>
         <p:blipFill>
-          <a:blip r:embed="rId2">
+          <a:blip r:embed="rId6">
             <a:extLst/>
           </a:blip>
           <a:stretch>
@@ -7941,8 +8345,8 @@
         </p:blipFill>
         <p:spPr>
           <a:xfrm>
-            <a:off x="2954746" y="3264470"/>
-            <a:ext cx="3710854" cy="3710854"/>
+            <a:off x="6242865" y="6014215"/>
+            <a:ext cx="1400206" cy="1162990"/>
           </a:xfrm>
           <a:prstGeom prst="rect">
             <a:avLst/>
@@ -7952,45 +8356,16 @@
           </a:ln>
         </p:spPr>
       </p:pic>
-      <p:pic>
-        <p:nvPicPr>
-          <p:cNvPr id="303" name="이미지" descr="이미지"/>
-          <p:cNvPicPr>
-            <a:picLocks noChangeAspect="1"/>
-          </p:cNvPicPr>
-          <p:nvPr/>
-        </p:nvPicPr>
-        <p:blipFill>
-          <a:blip r:embed="rId3">
-            <a:extLst/>
-          </a:blip>
-          <a:stretch>
-            <a:fillRect/>
-          </a:stretch>
-        </p:blipFill>
-        <p:spPr>
-          <a:xfrm>
-            <a:off x="11415576" y="4658057"/>
-            <a:ext cx="11915083" cy="4442554"/>
-          </a:xfrm>
-          <a:prstGeom prst="rect">
-            <a:avLst/>
-          </a:prstGeom>
-          <a:ln w="12700">
-            <a:miter lim="400000"/>
-          </a:ln>
-        </p:spPr>
-      </p:pic>
       <p:sp>
         <p:nvSpPr>
-          <p:cNvPr id="304" name="팀이 사용하고 있는 Trello를 같이 보면서 진행사항을 모두 체크해주셨고, 이로 인해 각 항목별로 멘토님의 조언을 받을 수 있었다."/>
+          <p:cNvPr id="315" name="TextBox 21"/>
           <p:cNvSpPr txBox="1"/>
           <p:nvPr/>
         </p:nvSpPr>
         <p:spPr>
           <a:xfrm>
-            <a:off x="12797835" y="9985864"/>
-            <a:ext cx="11137778" cy="2069110"/>
+            <a:off x="11957819" y="6623050"/>
+            <a:ext cx="2017190" cy="469901"/>
           </a:xfrm>
           <a:prstGeom prst="rect">
             <a:avLst/>
@@ -8005,17 +8380,14 @@
           </a:extLst>
         </p:spPr>
         <p:txBody>
-          <a:bodyPr lIns="50800" tIns="50800" rIns="50800" bIns="50800">
-            <a:normAutofit fontScale="100000" lnSpcReduction="0"/>
+          <a:bodyPr lIns="50800" tIns="50800" rIns="50800" bIns="50800" anchor="ctr">
+            <a:spAutoFit/>
           </a:bodyPr>
           <a:lstStyle>
-            <a:lvl1pPr>
-              <a:lnSpc>
-                <a:spcPct val="150000"/>
-              </a:lnSpc>
-              <a:defRPr sz="3000">
+            <a:lvl1pPr algn="ctr">
+              <a:defRPr b="1" sz="2400">
                 <a:solidFill>
-                  <a:srgbClr val="838383"/>
+                  <a:srgbClr val="232323"/>
                 </a:solidFill>
                 <a:latin typeface="+mn-lt"/>
                 <a:ea typeface="+mn-ea"/>
@@ -8027,154 +8399,7 @@
           <a:p>
             <a:pPr/>
             <a:r>
-              <a:t>팀이 사용하고 있는 Trello를 같이 보면서 진행사항을 모두 체크해주셨고, 이로 인해 각 항목별로 멘토님의 조언을 받을 수 있었다.</a:t>
-            </a:r>
-          </a:p>
-        </p:txBody>
-      </p:sp>
-      <p:sp>
-        <p:nvSpPr>
-          <p:cNvPr id="305" name="Modeling 방향에 대해서도 많은 조언"/>
-          <p:cNvSpPr txBox="1"/>
-          <p:nvPr/>
-        </p:nvSpPr>
-        <p:spPr>
-          <a:xfrm>
-            <a:off x="1964235" y="7620907"/>
-            <a:ext cx="6626332" cy="715798"/>
-          </a:xfrm>
-          <a:prstGeom prst="rect">
-            <a:avLst/>
-          </a:prstGeom>
-          <a:ln w="12700">
-            <a:miter lim="400000"/>
-          </a:ln>
-          <a:extLst>
-            <a:ext uri="{C572A759-6A51-4108-AA02-DFA0A04FC94B}">
-              <ma14:wrappingTextBoxFlag xmlns:ma14="http://schemas.microsoft.com/office/mac/drawingml/2011/main" val="1"/>
-            </a:ext>
-          </a:extLst>
-        </p:spPr>
-        <p:txBody>
-          <a:bodyPr lIns="50800" tIns="50800" rIns="50800" bIns="50800">
-            <a:normAutofit fontScale="100000" lnSpcReduction="0"/>
-          </a:bodyPr>
-          <a:lstStyle/>
-          <a:p>
-            <a:pPr>
-              <a:lnSpc>
-                <a:spcPct val="150000"/>
-              </a:lnSpc>
-              <a:defRPr sz="3000">
-                <a:solidFill>
-                  <a:srgbClr val="838383"/>
-                </a:solidFill>
-                <a:latin typeface="+mn-lt"/>
-                <a:ea typeface="+mn-ea"/>
-                <a:cs typeface="+mn-cs"/>
-                <a:sym typeface="Helvetica"/>
-              </a:defRPr>
-            </a:pPr>
-            <a:r>
-              <a:t>AI </a:t>
-            </a:r>
-            <a:r>
-              <a:t>모델 개발</a:t>
-            </a:r>
-            <a:r>
-              <a:t>에 대</a:t>
-            </a:r>
-            <a:r>
-              <a:t>한</a:t>
-            </a:r>
-            <a:r>
-              <a:t> </a:t>
-            </a:r>
-            <a:r>
-              <a:t>구체적인</a:t>
-            </a:r>
-            <a:r>
-              <a:t> 조언</a:t>
-            </a:r>
-          </a:p>
-        </p:txBody>
-      </p:sp>
-      <p:pic>
-        <p:nvPicPr>
-          <p:cNvPr id="306" name="이미지" descr="이미지"/>
-          <p:cNvPicPr>
-            <a:picLocks noChangeAspect="1"/>
-          </p:cNvPicPr>
-          <p:nvPr/>
-        </p:nvPicPr>
-        <p:blipFill>
-          <a:blip r:embed="rId4">
-            <a:extLst/>
-          </a:blip>
-          <a:stretch>
-            <a:fillRect/>
-          </a:stretch>
-        </p:blipFill>
-        <p:spPr>
-          <a:xfrm>
-            <a:off x="3489088" y="8775923"/>
-            <a:ext cx="3179693" cy="3179692"/>
-          </a:xfrm>
-          <a:prstGeom prst="rect">
-            <a:avLst/>
-          </a:prstGeom>
-          <a:ln w="12700">
-            <a:miter lim="400000"/>
-          </a:ln>
-        </p:spPr>
-      </p:pic>
-      <p:sp>
-        <p:nvSpPr>
-          <p:cNvPr id="307" name="그 밖에도 실무에서 사용하는 유용한 정보들에 대해서도 많은 조언"/>
-          <p:cNvSpPr txBox="1"/>
-          <p:nvPr/>
-        </p:nvSpPr>
-        <p:spPr>
-          <a:xfrm>
-            <a:off x="307636" y="12394831"/>
-            <a:ext cx="11884363" cy="948865"/>
-          </a:xfrm>
-          <a:prstGeom prst="rect">
-            <a:avLst/>
-          </a:prstGeom>
-          <a:ln w="12700">
-            <a:miter lim="400000"/>
-          </a:ln>
-          <a:extLst>
-            <a:ext uri="{C572A759-6A51-4108-AA02-DFA0A04FC94B}">
-              <ma14:wrappingTextBoxFlag xmlns:ma14="http://schemas.microsoft.com/office/mac/drawingml/2011/main" val="1"/>
-            </a:ext>
-          </a:extLst>
-        </p:spPr>
-        <p:txBody>
-          <a:bodyPr lIns="50800" tIns="50800" rIns="50800" bIns="50800">
-            <a:normAutofit fontScale="100000" lnSpcReduction="0"/>
-          </a:bodyPr>
-          <a:lstStyle>
-            <a:lvl1pPr>
-              <a:lnSpc>
-                <a:spcPct val="150000"/>
-              </a:lnSpc>
-              <a:defRPr sz="3000">
-                <a:solidFill>
-                  <a:srgbClr val="838383"/>
-                </a:solidFill>
-                <a:latin typeface="+mn-lt"/>
-                <a:ea typeface="+mn-ea"/>
-                <a:cs typeface="+mn-cs"/>
-                <a:sym typeface="Helvetica"/>
-              </a:defRPr>
-            </a:lvl1pPr>
-          </a:lstStyle>
-          <a:p>
-            <a:pPr/>
-            <a:r>
-              <a:t>그 밖에도 실무에서 사용하는 유용한 정보들에 대해서도 많은 조언</a:t>
+              <a:t>Commit</a:t>
             </a:r>
           </a:p>
         </p:txBody>
@@ -8207,7 +8432,7 @@
       </p:grpSpPr>
       <p:sp>
         <p:nvSpPr>
-          <p:cNvPr id="309" name="슬라이드 번호"/>
+          <p:cNvPr id="317" name="슬라이드 번호"/>
           <p:cNvSpPr txBox="1"/>
           <p:nvPr>
             <p:ph type="sldNum" sz="quarter" idx="4294967295"/>
@@ -8238,7 +8463,7 @@
       </p:sp>
       <p:sp>
         <p:nvSpPr>
-          <p:cNvPr id="310" name="기대 효과"/>
+          <p:cNvPr id="318" name="멘토링 - Modeling"/>
           <p:cNvSpPr txBox="1"/>
           <p:nvPr>
             <p:ph type="title"/>
@@ -8247,7 +8472,7 @@
         <p:spPr>
           <a:xfrm>
             <a:off x="843969" y="993132"/>
-            <a:ext cx="10922139" cy="1902088"/>
+            <a:ext cx="23333424" cy="1902088"/>
           </a:xfrm>
           <a:prstGeom prst="rect">
             <a:avLst/>
@@ -8259,14 +8484,393 @@
           <a:p>
             <a:pPr/>
             <a:r>
-              <a:t>기대 효과</a:t>
+              <a:t>멘토</a:t>
+            </a:r>
+            <a:r>
+              <a:t>링</a:t>
             </a:r>
           </a:p>
         </p:txBody>
       </p:sp>
       <p:sp>
         <p:nvSpPr>
-          <p:cNvPr id="311" name="도형"/>
+          <p:cNvPr id="319" name="선"/>
+          <p:cNvSpPr/>
+          <p:nvPr/>
+        </p:nvSpPr>
+        <p:spPr>
+          <a:xfrm flipV="1">
+            <a:off x="853156" y="2606184"/>
+            <a:ext cx="23315050" cy="2"/>
+          </a:xfrm>
+          <a:prstGeom prst="line">
+            <a:avLst/>
+          </a:prstGeom>
+          <a:ln w="25400">
+            <a:solidFill>
+              <a:srgbClr val="818779"/>
+            </a:solidFill>
+            <a:miter lim="400000"/>
+          </a:ln>
+        </p:spPr>
+        <p:txBody>
+          <a:bodyPr lIns="45718" tIns="45718" rIns="45718" bIns="45718"/>
+          <a:lstStyle/>
+          <a:p>
+            <a:pPr>
+              <a:defRPr>
+                <a:solidFill>
+                  <a:srgbClr val="818779"/>
+                </a:solidFill>
+              </a:defRPr>
+            </a:pPr>
+          </a:p>
+        </p:txBody>
+      </p:sp>
+      <p:pic>
+        <p:nvPicPr>
+          <p:cNvPr id="320" name="이미지" descr="이미지"/>
+          <p:cNvPicPr>
+            <a:picLocks noChangeAspect="1"/>
+          </p:cNvPicPr>
+          <p:nvPr/>
+        </p:nvPicPr>
+        <p:blipFill>
+          <a:blip r:embed="rId2">
+            <a:extLst/>
+          </a:blip>
+          <a:stretch>
+            <a:fillRect/>
+          </a:stretch>
+        </p:blipFill>
+        <p:spPr>
+          <a:xfrm>
+            <a:off x="2954746" y="3264470"/>
+            <a:ext cx="3710854" cy="3710854"/>
+          </a:xfrm>
+          <a:prstGeom prst="rect">
+            <a:avLst/>
+          </a:prstGeom>
+          <a:ln w="12700">
+            <a:miter lim="400000"/>
+          </a:ln>
+        </p:spPr>
+      </p:pic>
+      <p:pic>
+        <p:nvPicPr>
+          <p:cNvPr id="321" name="이미지" descr="이미지"/>
+          <p:cNvPicPr>
+            <a:picLocks noChangeAspect="1"/>
+          </p:cNvPicPr>
+          <p:nvPr/>
+        </p:nvPicPr>
+        <p:blipFill>
+          <a:blip r:embed="rId3">
+            <a:extLst/>
+          </a:blip>
+          <a:stretch>
+            <a:fillRect/>
+          </a:stretch>
+        </p:blipFill>
+        <p:spPr>
+          <a:xfrm>
+            <a:off x="11415576" y="4658057"/>
+            <a:ext cx="11915083" cy="4442554"/>
+          </a:xfrm>
+          <a:prstGeom prst="rect">
+            <a:avLst/>
+          </a:prstGeom>
+          <a:ln w="12700">
+            <a:miter lim="400000"/>
+          </a:ln>
+        </p:spPr>
+      </p:pic>
+      <p:sp>
+        <p:nvSpPr>
+          <p:cNvPr id="322" name="팀이 사용하고 있는 Trello를 같이 보면서 진행사항을 모두 체크해주셨고, 이로 인해 각 항목별로 멘토님의 조언을 받을 수 있었다."/>
+          <p:cNvSpPr txBox="1"/>
+          <p:nvPr/>
+        </p:nvSpPr>
+        <p:spPr>
+          <a:xfrm>
+            <a:off x="12797835" y="9985864"/>
+            <a:ext cx="11137778" cy="2069110"/>
+          </a:xfrm>
+          <a:prstGeom prst="rect">
+            <a:avLst/>
+          </a:prstGeom>
+          <a:ln w="12700">
+            <a:miter lim="400000"/>
+          </a:ln>
+          <a:extLst>
+            <a:ext uri="{C572A759-6A51-4108-AA02-DFA0A04FC94B}">
+              <ma14:wrappingTextBoxFlag xmlns:ma14="http://schemas.microsoft.com/office/mac/drawingml/2011/main" val="1"/>
+            </a:ext>
+          </a:extLst>
+        </p:spPr>
+        <p:txBody>
+          <a:bodyPr lIns="50800" tIns="50800" rIns="50800" bIns="50800">
+            <a:normAutofit fontScale="100000" lnSpcReduction="0"/>
+          </a:bodyPr>
+          <a:lstStyle>
+            <a:lvl1pPr>
+              <a:lnSpc>
+                <a:spcPct val="150000"/>
+              </a:lnSpc>
+              <a:defRPr sz="3000">
+                <a:solidFill>
+                  <a:srgbClr val="838383"/>
+                </a:solidFill>
+                <a:latin typeface="+mn-lt"/>
+                <a:ea typeface="+mn-ea"/>
+                <a:cs typeface="+mn-cs"/>
+                <a:sym typeface="Helvetica"/>
+              </a:defRPr>
+            </a:lvl1pPr>
+          </a:lstStyle>
+          <a:p>
+            <a:pPr/>
+            <a:r>
+              <a:t>팀이 사용하고 있는 Trello를 같이 보면서 진행사항을 모두 체크해주셨고, 이로 인해 각 항목별로 멘토님의 조언을 받을 수 있었다.</a:t>
+            </a:r>
+          </a:p>
+        </p:txBody>
+      </p:sp>
+      <p:sp>
+        <p:nvSpPr>
+          <p:cNvPr id="323" name="Modeling 방향에 대해서도 많은 조언"/>
+          <p:cNvSpPr txBox="1"/>
+          <p:nvPr/>
+        </p:nvSpPr>
+        <p:spPr>
+          <a:xfrm>
+            <a:off x="1964235" y="7620907"/>
+            <a:ext cx="6626332" cy="715798"/>
+          </a:xfrm>
+          <a:prstGeom prst="rect">
+            <a:avLst/>
+          </a:prstGeom>
+          <a:ln w="12700">
+            <a:miter lim="400000"/>
+          </a:ln>
+          <a:extLst>
+            <a:ext uri="{C572A759-6A51-4108-AA02-DFA0A04FC94B}">
+              <ma14:wrappingTextBoxFlag xmlns:ma14="http://schemas.microsoft.com/office/mac/drawingml/2011/main" val="1"/>
+            </a:ext>
+          </a:extLst>
+        </p:spPr>
+        <p:txBody>
+          <a:bodyPr lIns="50800" tIns="50800" rIns="50800" bIns="50800">
+            <a:normAutofit fontScale="100000" lnSpcReduction="0"/>
+          </a:bodyPr>
+          <a:lstStyle/>
+          <a:p>
+            <a:pPr>
+              <a:lnSpc>
+                <a:spcPct val="150000"/>
+              </a:lnSpc>
+              <a:defRPr sz="3000">
+                <a:solidFill>
+                  <a:srgbClr val="838383"/>
+                </a:solidFill>
+                <a:latin typeface="+mn-lt"/>
+                <a:ea typeface="+mn-ea"/>
+                <a:cs typeface="+mn-cs"/>
+                <a:sym typeface="Helvetica"/>
+              </a:defRPr>
+            </a:pPr>
+            <a:r>
+              <a:t>AI </a:t>
+            </a:r>
+            <a:r>
+              <a:t>모델 개발</a:t>
+            </a:r>
+            <a:r>
+              <a:t>에 대</a:t>
+            </a:r>
+            <a:r>
+              <a:t>한</a:t>
+            </a:r>
+            <a:r>
+              <a:t> </a:t>
+            </a:r>
+            <a:r>
+              <a:t>구체적인</a:t>
+            </a:r>
+            <a:r>
+              <a:t> 조언</a:t>
+            </a:r>
+          </a:p>
+        </p:txBody>
+      </p:sp>
+      <p:pic>
+        <p:nvPicPr>
+          <p:cNvPr id="324" name="이미지" descr="이미지"/>
+          <p:cNvPicPr>
+            <a:picLocks noChangeAspect="1"/>
+          </p:cNvPicPr>
+          <p:nvPr/>
+        </p:nvPicPr>
+        <p:blipFill>
+          <a:blip r:embed="rId4">
+            <a:extLst/>
+          </a:blip>
+          <a:stretch>
+            <a:fillRect/>
+          </a:stretch>
+        </p:blipFill>
+        <p:spPr>
+          <a:xfrm>
+            <a:off x="3489088" y="8775923"/>
+            <a:ext cx="3179693" cy="3179692"/>
+          </a:xfrm>
+          <a:prstGeom prst="rect">
+            <a:avLst/>
+          </a:prstGeom>
+          <a:ln w="12700">
+            <a:miter lim="400000"/>
+          </a:ln>
+        </p:spPr>
+      </p:pic>
+      <p:sp>
+        <p:nvSpPr>
+          <p:cNvPr id="325" name="그 밖에도 실무에서 사용하는 유용한 정보들에 대해서도 많은 조언"/>
+          <p:cNvSpPr txBox="1"/>
+          <p:nvPr/>
+        </p:nvSpPr>
+        <p:spPr>
+          <a:xfrm>
+            <a:off x="307636" y="12394831"/>
+            <a:ext cx="11884363" cy="948865"/>
+          </a:xfrm>
+          <a:prstGeom prst="rect">
+            <a:avLst/>
+          </a:prstGeom>
+          <a:ln w="12700">
+            <a:miter lim="400000"/>
+          </a:ln>
+          <a:extLst>
+            <a:ext uri="{C572A759-6A51-4108-AA02-DFA0A04FC94B}">
+              <ma14:wrappingTextBoxFlag xmlns:ma14="http://schemas.microsoft.com/office/mac/drawingml/2011/main" val="1"/>
+            </a:ext>
+          </a:extLst>
+        </p:spPr>
+        <p:txBody>
+          <a:bodyPr lIns="50800" tIns="50800" rIns="50800" bIns="50800">
+            <a:normAutofit fontScale="100000" lnSpcReduction="0"/>
+          </a:bodyPr>
+          <a:lstStyle>
+            <a:lvl1pPr>
+              <a:lnSpc>
+                <a:spcPct val="150000"/>
+              </a:lnSpc>
+              <a:defRPr sz="3000">
+                <a:solidFill>
+                  <a:srgbClr val="838383"/>
+                </a:solidFill>
+                <a:latin typeface="+mn-lt"/>
+                <a:ea typeface="+mn-ea"/>
+                <a:cs typeface="+mn-cs"/>
+                <a:sym typeface="Helvetica"/>
+              </a:defRPr>
+            </a:lvl1pPr>
+          </a:lstStyle>
+          <a:p>
+            <a:pPr/>
+            <a:r>
+              <a:t>그 밖에도 실무에서 사용하는 유용한 정보들에 대해서도 많은 조언</a:t>
+            </a:r>
+          </a:p>
+        </p:txBody>
+      </p:sp>
+    </p:spTree>
+  </p:cSld>
+  <p:clrMapOvr>
+    <a:masterClrMapping/>
+  </p:clrMapOvr>
+  <p:transition xmlns:p14="http://schemas.microsoft.com/office/powerpoint/2010/main" spd="med" advClick="1"/>
+</p:sld>
+</file>
+
+<file path=ppt/slides/slide19.xml><?xml version="1.0" encoding="utf-8"?>
+<p:sld xmlns:a="http://schemas.openxmlformats.org/drawingml/2006/main" xmlns:r="http://schemas.openxmlformats.org/officeDocument/2006/relationships" xmlns:p="http://schemas.openxmlformats.org/presentationml/2006/main" xmlns:m="http://schemas.openxmlformats.org/officeDocument/2006/math" xmlns:a14="http://schemas.microsoft.com/office/drawing/2010/main" showMasterSp="1" showMasterPhAnim="1">
+  <p:cSld>
+    <p:spTree>
+      <p:nvGrpSpPr>
+        <p:cNvPr id="1" name=""/>
+        <p:cNvGrpSpPr/>
+        <p:nvPr/>
+      </p:nvGrpSpPr>
+      <p:grpSpPr>
+        <a:xfrm>
+          <a:off x="0" y="0"/>
+          <a:ext cx="0" cy="0"/>
+          <a:chOff x="0" y="0"/>
+          <a:chExt cx="0" cy="0"/>
+        </a:xfrm>
+      </p:grpSpPr>
+      <p:sp>
+        <p:nvSpPr>
+          <p:cNvPr id="327" name="슬라이드 번호"/>
+          <p:cNvSpPr txBox="1"/>
+          <p:nvPr>
+            <p:ph type="sldNum" sz="quarter" idx="4294967295"/>
+          </p:nvPr>
+        </p:nvSpPr>
+        <p:spPr>
+          <a:xfrm>
+            <a:off x="22927548" y="12437698"/>
+            <a:ext cx="467458" cy="482601"/>
+          </a:xfrm>
+          <a:prstGeom prst="rect">
+            <a:avLst/>
+          </a:prstGeom>
+          <a:extLst>
+            <a:ext uri="{C572A759-6A51-4108-AA02-DFA0A04FC94B}">
+              <ma14:wrappingTextBoxFlag xmlns:ma14="http://schemas.microsoft.com/office/mac/drawingml/2011/main" val="1"/>
+            </a:ext>
+          </a:extLst>
+        </p:spPr>
+        <p:txBody>
+          <a:bodyPr/>
+          <a:lstStyle/>
+          <a:p>
+            <a:pPr/>
+            <a:fld id="{86CB4B4D-7CA3-9044-876B-883B54F8677D}" type="slidenum"/>
+          </a:p>
+        </p:txBody>
+      </p:sp>
+      <p:sp>
+        <p:nvSpPr>
+          <p:cNvPr id="328" name="기대 효과"/>
+          <p:cNvSpPr txBox="1"/>
+          <p:nvPr>
+            <p:ph type="title"/>
+          </p:nvPr>
+        </p:nvSpPr>
+        <p:spPr>
+          <a:xfrm>
+            <a:off x="843969" y="993132"/>
+            <a:ext cx="10922139" cy="1902088"/>
+          </a:xfrm>
+          <a:prstGeom prst="rect">
+            <a:avLst/>
+          </a:prstGeom>
+        </p:spPr>
+        <p:txBody>
+          <a:bodyPr/>
+          <a:lstStyle/>
+          <a:p>
+            <a:pPr/>
+            <a:r>
+              <a:t>기대 효과</a:t>
+            </a:r>
+          </a:p>
+        </p:txBody>
+      </p:sp>
+      <p:sp>
+        <p:nvSpPr>
+          <p:cNvPr id="329" name="도형"/>
           <p:cNvSpPr/>
           <p:nvPr/>
         </p:nvSpPr>
@@ -8376,7 +8980,7 @@
       </p:sp>
       <p:sp>
         <p:nvSpPr>
-          <p:cNvPr id="312" name="도형"/>
+          <p:cNvPr id="330" name="도형"/>
           <p:cNvSpPr/>
           <p:nvPr/>
         </p:nvSpPr>
@@ -8486,7 +9090,7 @@
       </p:sp>
       <p:sp>
         <p:nvSpPr>
-          <p:cNvPr id="313" name="삼각형"/>
+          <p:cNvPr id="331" name="삼각형"/>
           <p:cNvSpPr/>
           <p:nvPr/>
         </p:nvSpPr>
@@ -8556,7 +9160,7 @@
       </p:sp>
       <p:sp>
         <p:nvSpPr>
-          <p:cNvPr id="314" name="삼각형"/>
+          <p:cNvPr id="332" name="삼각형"/>
           <p:cNvSpPr/>
           <p:nvPr/>
         </p:nvSpPr>
@@ -8626,7 +9230,7 @@
       </p:sp>
       <p:sp>
         <p:nvSpPr>
-          <p:cNvPr id="315" name="선"/>
+          <p:cNvPr id="333" name="선"/>
           <p:cNvSpPr/>
           <p:nvPr/>
         </p:nvSpPr>
@@ -8661,7 +9265,7 @@
       </p:sp>
       <p:sp>
         <p:nvSpPr>
-          <p:cNvPr id="316" name="자신의 얼굴형에 대한 정확한 인지"/>
+          <p:cNvPr id="334" name="자신의 얼굴형에 대한 정확한 인지"/>
           <p:cNvSpPr txBox="1"/>
           <p:nvPr/>
         </p:nvSpPr>
@@ -8735,7 +9339,7 @@
       </p:sp>
       <p:sp>
         <p:nvSpPr>
-          <p:cNvPr id="317" name="선"/>
+          <p:cNvPr id="335" name="선"/>
           <p:cNvSpPr/>
           <p:nvPr/>
         </p:nvSpPr>
@@ -8770,7 +9374,7 @@
       </p:sp>
       <p:sp>
         <p:nvSpPr>
-          <p:cNvPr id="318" name="자신의 얼굴형에 어울리는 헤어스타일 시도"/>
+          <p:cNvPr id="336" name="자신의 얼굴형에 어울리는 헤어스타일 시도"/>
           <p:cNvSpPr txBox="1"/>
           <p:nvPr/>
         </p:nvSpPr>
@@ -8844,7 +9448,7 @@
       </p:sp>
       <p:sp>
         <p:nvSpPr>
-          <p:cNvPr id="319" name="AI 접근성 향상"/>
+          <p:cNvPr id="337" name="AI 접근성 향상"/>
           <p:cNvSpPr txBox="1"/>
           <p:nvPr/>
         </p:nvSpPr>
@@ -8895,7 +9499,7 @@
       </p:sp>
       <p:sp>
         <p:nvSpPr>
-          <p:cNvPr id="320" name="선"/>
+          <p:cNvPr id="338" name="선"/>
           <p:cNvSpPr/>
           <p:nvPr/>
         </p:nvSpPr>
@@ -8925,138 +9529,6 @@
                 </a:solidFill>
               </a:defRPr>
             </a:pPr>
-          </a:p>
-        </p:txBody>
-      </p:sp>
-    </p:spTree>
-  </p:cSld>
-  <p:clrMapOvr>
-    <a:masterClrMapping/>
-  </p:clrMapOvr>
-  <p:transition xmlns:p14="http://schemas.microsoft.com/office/powerpoint/2010/main" spd="med" advClick="1"/>
-</p:sld>
-</file>
-
-<file path=ppt/slides/slide19.xml><?xml version="1.0" encoding="utf-8"?>
-<p:sld xmlns:a="http://schemas.openxmlformats.org/drawingml/2006/main" xmlns:r="http://schemas.openxmlformats.org/officeDocument/2006/relationships" xmlns:p="http://schemas.openxmlformats.org/presentationml/2006/main" xmlns:m="http://schemas.openxmlformats.org/officeDocument/2006/math" xmlns:a14="http://schemas.microsoft.com/office/drawing/2010/main" showMasterSp="1" showMasterPhAnim="1">
-  <p:cSld>
-    <p:spTree>
-      <p:nvGrpSpPr>
-        <p:cNvPr id="1" name=""/>
-        <p:cNvGrpSpPr/>
-        <p:nvPr/>
-      </p:nvGrpSpPr>
-      <p:grpSpPr>
-        <a:xfrm>
-          <a:off x="0" y="0"/>
-          <a:ext cx="0" cy="0"/>
-          <a:chOff x="0" y="0"/>
-          <a:chExt cx="0" cy="0"/>
-        </a:xfrm>
-      </p:grpSpPr>
-      <p:sp>
-        <p:nvSpPr>
-          <p:cNvPr id="322" name="직사각형"/>
-          <p:cNvSpPr/>
-          <p:nvPr/>
-        </p:nvSpPr>
-        <p:spPr>
-          <a:xfrm>
-            <a:off x="0" y="0"/>
-            <a:ext cx="24384000" cy="13716000"/>
-          </a:xfrm>
-          <a:prstGeom prst="rect">
-            <a:avLst/>
-          </a:prstGeom>
-          <a:solidFill>
-            <a:srgbClr val="818779"/>
-          </a:solidFill>
-          <a:ln w="12700">
-            <a:miter lim="400000"/>
-          </a:ln>
-        </p:spPr>
-        <p:txBody>
-          <a:bodyPr lIns="50800" tIns="50800" rIns="50800" bIns="50800" anchor="ctr"/>
-          <a:lstStyle/>
-          <a:p>
-            <a:pPr algn="ctr" defTabSz="825500">
-              <a:lnSpc>
-                <a:spcPct val="100000"/>
-              </a:lnSpc>
-              <a:defRPr b="1" sz="3200">
-                <a:latin typeface="+mn-lt"/>
-                <a:ea typeface="+mn-ea"/>
-                <a:cs typeface="+mn-cs"/>
-                <a:sym typeface="Helvetica"/>
-              </a:defRPr>
-            </a:pPr>
-          </a:p>
-        </p:txBody>
-      </p:sp>
-      <p:sp>
-        <p:nvSpPr>
-          <p:cNvPr id="323" name="선"/>
-          <p:cNvSpPr/>
-          <p:nvPr/>
-        </p:nvSpPr>
-        <p:spPr>
-          <a:xfrm flipV="1">
-            <a:off x="2286610" y="6857999"/>
-            <a:ext cx="19810780" cy="2"/>
-          </a:xfrm>
-          <a:prstGeom prst="line">
-            <a:avLst/>
-          </a:prstGeom>
-          <a:ln w="25400">
-            <a:solidFill>
-              <a:srgbClr val="F3F1E6"/>
-            </a:solidFill>
-            <a:miter lim="400000"/>
-          </a:ln>
-        </p:spPr>
-        <p:txBody>
-          <a:bodyPr lIns="45718" tIns="45718" rIns="45718" bIns="45718"/>
-          <a:lstStyle/>
-          <a:p>
-            <a:pPr>
-              <a:defRPr>
-                <a:solidFill>
-                  <a:srgbClr val="818779"/>
-                </a:solidFill>
-              </a:defRPr>
-            </a:pPr>
-          </a:p>
-        </p:txBody>
-      </p:sp>
-      <p:sp>
-        <p:nvSpPr>
-          <p:cNvPr id="324" name="Thank you"/>
-          <p:cNvSpPr txBox="1"/>
-          <p:nvPr>
-            <p:ph type="title"/>
-          </p:nvPr>
-        </p:nvSpPr>
-        <p:spPr>
-          <a:xfrm>
-            <a:off x="2352410" y="3101708"/>
-            <a:ext cx="14018527" cy="4872780"/>
-          </a:xfrm>
-          <a:prstGeom prst="rect">
-            <a:avLst/>
-          </a:prstGeom>
-        </p:spPr>
-        <p:txBody>
-          <a:bodyPr/>
-          <a:lstStyle>
-            <a:lvl1pPr defTabSz="1779987">
-              <a:defRPr sz="21900"/>
-            </a:lvl1pPr>
-          </a:lstStyle>
-          <a:p>
-            <a:pPr/>
-            <a:r>
-              <a:t>Thank you</a:t>
-            </a:r>
           </a:p>
         </p:txBody>
       </p:sp>
@@ -9772,6 +10244,138 @@
             <a:pPr/>
             <a:r>
               <a:t>기대효과</a:t>
+            </a:r>
+          </a:p>
+        </p:txBody>
+      </p:sp>
+    </p:spTree>
+  </p:cSld>
+  <p:clrMapOvr>
+    <a:masterClrMapping/>
+  </p:clrMapOvr>
+  <p:transition xmlns:p14="http://schemas.microsoft.com/office/powerpoint/2010/main" spd="med" advClick="1"/>
+</p:sld>
+</file>
+
+<file path=ppt/slides/slide20.xml><?xml version="1.0" encoding="utf-8"?>
+<p:sld xmlns:a="http://schemas.openxmlformats.org/drawingml/2006/main" xmlns:r="http://schemas.openxmlformats.org/officeDocument/2006/relationships" xmlns:p="http://schemas.openxmlformats.org/presentationml/2006/main" xmlns:m="http://schemas.openxmlformats.org/officeDocument/2006/math" xmlns:a14="http://schemas.microsoft.com/office/drawing/2010/main" showMasterSp="1" showMasterPhAnim="1">
+  <p:cSld>
+    <p:spTree>
+      <p:nvGrpSpPr>
+        <p:cNvPr id="1" name=""/>
+        <p:cNvGrpSpPr/>
+        <p:nvPr/>
+      </p:nvGrpSpPr>
+      <p:grpSpPr>
+        <a:xfrm>
+          <a:off x="0" y="0"/>
+          <a:ext cx="0" cy="0"/>
+          <a:chOff x="0" y="0"/>
+          <a:chExt cx="0" cy="0"/>
+        </a:xfrm>
+      </p:grpSpPr>
+      <p:sp>
+        <p:nvSpPr>
+          <p:cNvPr id="340" name="직사각형"/>
+          <p:cNvSpPr/>
+          <p:nvPr/>
+        </p:nvSpPr>
+        <p:spPr>
+          <a:xfrm>
+            <a:off x="0" y="0"/>
+            <a:ext cx="24384000" cy="13716000"/>
+          </a:xfrm>
+          <a:prstGeom prst="rect">
+            <a:avLst/>
+          </a:prstGeom>
+          <a:solidFill>
+            <a:srgbClr val="818779"/>
+          </a:solidFill>
+          <a:ln w="12700">
+            <a:miter lim="400000"/>
+          </a:ln>
+        </p:spPr>
+        <p:txBody>
+          <a:bodyPr lIns="50800" tIns="50800" rIns="50800" bIns="50800" anchor="ctr"/>
+          <a:lstStyle/>
+          <a:p>
+            <a:pPr algn="ctr" defTabSz="825500">
+              <a:lnSpc>
+                <a:spcPct val="100000"/>
+              </a:lnSpc>
+              <a:defRPr b="1" sz="3200">
+                <a:latin typeface="+mn-lt"/>
+                <a:ea typeface="+mn-ea"/>
+                <a:cs typeface="+mn-cs"/>
+                <a:sym typeface="Helvetica"/>
+              </a:defRPr>
+            </a:pPr>
+          </a:p>
+        </p:txBody>
+      </p:sp>
+      <p:sp>
+        <p:nvSpPr>
+          <p:cNvPr id="341" name="선"/>
+          <p:cNvSpPr/>
+          <p:nvPr/>
+        </p:nvSpPr>
+        <p:spPr>
+          <a:xfrm flipV="1">
+            <a:off x="2286610" y="6857999"/>
+            <a:ext cx="19810780" cy="2"/>
+          </a:xfrm>
+          <a:prstGeom prst="line">
+            <a:avLst/>
+          </a:prstGeom>
+          <a:ln w="25400">
+            <a:solidFill>
+              <a:srgbClr val="F3F1E6"/>
+            </a:solidFill>
+            <a:miter lim="400000"/>
+          </a:ln>
+        </p:spPr>
+        <p:txBody>
+          <a:bodyPr lIns="45718" tIns="45718" rIns="45718" bIns="45718"/>
+          <a:lstStyle/>
+          <a:p>
+            <a:pPr>
+              <a:defRPr>
+                <a:solidFill>
+                  <a:srgbClr val="818779"/>
+                </a:solidFill>
+              </a:defRPr>
+            </a:pPr>
+          </a:p>
+        </p:txBody>
+      </p:sp>
+      <p:sp>
+        <p:nvSpPr>
+          <p:cNvPr id="342" name="Thank you"/>
+          <p:cNvSpPr txBox="1"/>
+          <p:nvPr>
+            <p:ph type="title"/>
+          </p:nvPr>
+        </p:nvSpPr>
+        <p:spPr>
+          <a:xfrm>
+            <a:off x="2352410" y="3101708"/>
+            <a:ext cx="14018527" cy="4872780"/>
+          </a:xfrm>
+          <a:prstGeom prst="rect">
+            <a:avLst/>
+          </a:prstGeom>
+        </p:spPr>
+        <p:txBody>
+          <a:bodyPr/>
+          <a:lstStyle>
+            <a:lvl1pPr defTabSz="1779987">
+              <a:defRPr sz="21900"/>
+            </a:lvl1pPr>
+          </a:lstStyle>
+          <a:p>
+            <a:pPr/>
+            <a:r>
+              <a:t>Thank you</a:t>
             </a:r>
           </a:p>
         </p:txBody>

</xml_diff>